<commit_message>
FL Security introduction PPT update
</commit_message>
<xml_diff>
--- a/PPT/SecFL-Beibei Li.pptx
+++ b/PPT/SecFL-Beibei Li.pptx
@@ -5,7 +5,7 @@
     <p:sldMasterId id="2147483648" r:id="rId1"/>
   </p:sldMasterIdLst>
   <p:notesMasterIdLst>
-    <p:notesMasterId r:id="rId27"/>
+    <p:notesMasterId r:id="rId24"/>
   </p:notesMasterIdLst>
   <p:sldIdLst>
     <p:sldId id="422" r:id="rId2"/>
@@ -26,13 +26,10 @@
     <p:sldId id="351" r:id="rId17"/>
     <p:sldId id="361" r:id="rId18"/>
     <p:sldId id="368" r:id="rId19"/>
-    <p:sldId id="353" r:id="rId20"/>
-    <p:sldId id="369" r:id="rId21"/>
-    <p:sldId id="367" r:id="rId22"/>
-    <p:sldId id="357" r:id="rId23"/>
-    <p:sldId id="366" r:id="rId24"/>
-    <p:sldId id="347" r:id="rId25"/>
-    <p:sldId id="448" r:id="rId26"/>
+    <p:sldId id="357" r:id="rId20"/>
+    <p:sldId id="366" r:id="rId21"/>
+    <p:sldId id="347" r:id="rId22"/>
+    <p:sldId id="448" r:id="rId23"/>
   </p:sldIdLst>
   <p:sldSz cx="12192000" cy="6858000"/>
   <p:notesSz cx="6858000" cy="9144000"/>
@@ -162,9 +159,6 @@
             <p14:sldId id="351"/>
             <p14:sldId id="361"/>
             <p14:sldId id="368"/>
-            <p14:sldId id="353"/>
-            <p14:sldId id="369"/>
-            <p14:sldId id="367"/>
             <p14:sldId id="357"/>
             <p14:sldId id="366"/>
             <p14:sldId id="347"/>
@@ -649,259 +643,7 @@
           <a:p>
             <a:fld id="{84D44B96-76E6-40D2-B35B-1472F7BD7205}" type="slidenum">
               <a:rPr lang="zh-CN" altLang="en-US" smtClean="0"/>
-              <a:t>19</a:t>
-            </a:fld>
-            <a:endParaRPr lang="zh-CN" altLang="en-US"/>
-          </a:p>
-        </p:txBody>
-      </p:sp>
-    </p:spTree>
-    <p:extLst>
-      <p:ext uri="{BB962C8B-B14F-4D97-AF65-F5344CB8AC3E}">
-        <p14:creationId xmlns:p14="http://schemas.microsoft.com/office/powerpoint/2010/main" val="245010319"/>
-      </p:ext>
-    </p:extLst>
-  </p:cSld>
-  <p:clrMapOvr>
-    <a:masterClrMapping/>
-  </p:clrMapOvr>
-</p:notes>
-</file>
-
-<file path=ppt/notesSlides/notesSlide11.xml><?xml version="1.0" encoding="utf-8"?>
-<p:notes xmlns:a="http://schemas.openxmlformats.org/drawingml/2006/main" xmlns:r="http://schemas.openxmlformats.org/officeDocument/2006/relationships" xmlns:p="http://schemas.openxmlformats.org/presentationml/2006/main">
-  <p:cSld>
-    <p:spTree>
-      <p:nvGrpSpPr>
-        <p:cNvPr id="1" name=""/>
-        <p:cNvGrpSpPr/>
-        <p:nvPr/>
-      </p:nvGrpSpPr>
-      <p:grpSpPr>
-        <a:xfrm>
-          <a:off x="0" y="0"/>
-          <a:ext cx="0" cy="0"/>
-          <a:chOff x="0" y="0"/>
-          <a:chExt cx="0" cy="0"/>
-        </a:xfrm>
-      </p:grpSpPr>
-      <p:sp>
-        <p:nvSpPr>
-          <p:cNvPr id="2" name="幻灯片图像占位符 1"/>
-          <p:cNvSpPr>
-            <a:spLocks noGrp="1" noRot="1" noChangeAspect="1"/>
-          </p:cNvSpPr>
-          <p:nvPr>
-            <p:ph type="sldImg"/>
-          </p:nvPr>
-        </p:nvSpPr>
-        <p:spPr/>
-      </p:sp>
-      <p:sp>
-        <p:nvSpPr>
-          <p:cNvPr id="3" name="备注占位符 2"/>
-          <p:cNvSpPr>
-            <a:spLocks noGrp="1"/>
-          </p:cNvSpPr>
-          <p:nvPr>
-            <p:ph type="body" idx="1"/>
-          </p:nvPr>
-        </p:nvSpPr>
-        <p:spPr/>
-        <p:txBody>
-          <a:bodyPr/>
-          <a:lstStyle/>
-          <a:p>
-            <a:endParaRPr lang="zh-CN" altLang="en-US" dirty="0"/>
-          </a:p>
-        </p:txBody>
-      </p:sp>
-      <p:sp>
-        <p:nvSpPr>
-          <p:cNvPr id="4" name="灯片编号占位符 3"/>
-          <p:cNvSpPr>
-            <a:spLocks noGrp="1"/>
-          </p:cNvSpPr>
-          <p:nvPr>
-            <p:ph type="sldNum" sz="quarter" idx="5"/>
-          </p:nvPr>
-        </p:nvSpPr>
-        <p:spPr/>
-        <p:txBody>
-          <a:bodyPr/>
-          <a:lstStyle/>
-          <a:p>
-            <a:fld id="{84D44B96-76E6-40D2-B35B-1472F7BD7205}" type="slidenum">
-              <a:rPr lang="zh-CN" altLang="en-US" smtClean="0"/>
-              <a:t>20</a:t>
-            </a:fld>
-            <a:endParaRPr lang="zh-CN" altLang="en-US"/>
-          </a:p>
-        </p:txBody>
-      </p:sp>
-    </p:spTree>
-    <p:extLst>
-      <p:ext uri="{BB962C8B-B14F-4D97-AF65-F5344CB8AC3E}">
-        <p14:creationId xmlns:p14="http://schemas.microsoft.com/office/powerpoint/2010/main" val="2452936479"/>
-      </p:ext>
-    </p:extLst>
-  </p:cSld>
-  <p:clrMapOvr>
-    <a:masterClrMapping/>
-  </p:clrMapOvr>
-</p:notes>
-</file>
-
-<file path=ppt/notesSlides/notesSlide12.xml><?xml version="1.0" encoding="utf-8"?>
-<p:notes xmlns:a="http://schemas.openxmlformats.org/drawingml/2006/main" xmlns:r="http://schemas.openxmlformats.org/officeDocument/2006/relationships" xmlns:p="http://schemas.openxmlformats.org/presentationml/2006/main">
-  <p:cSld>
-    <p:spTree>
-      <p:nvGrpSpPr>
-        <p:cNvPr id="1" name=""/>
-        <p:cNvGrpSpPr/>
-        <p:nvPr/>
-      </p:nvGrpSpPr>
-      <p:grpSpPr>
-        <a:xfrm>
-          <a:off x="0" y="0"/>
-          <a:ext cx="0" cy="0"/>
-          <a:chOff x="0" y="0"/>
-          <a:chExt cx="0" cy="0"/>
-        </a:xfrm>
-      </p:grpSpPr>
-      <p:sp>
-        <p:nvSpPr>
-          <p:cNvPr id="2" name="幻灯片图像占位符 1"/>
-          <p:cNvSpPr>
-            <a:spLocks noGrp="1" noRot="1" noChangeAspect="1"/>
-          </p:cNvSpPr>
-          <p:nvPr>
-            <p:ph type="sldImg"/>
-          </p:nvPr>
-        </p:nvSpPr>
-        <p:spPr/>
-      </p:sp>
-      <p:sp>
-        <p:nvSpPr>
-          <p:cNvPr id="3" name="备注占位符 2"/>
-          <p:cNvSpPr>
-            <a:spLocks noGrp="1"/>
-          </p:cNvSpPr>
-          <p:nvPr>
-            <p:ph type="body" idx="1"/>
-          </p:nvPr>
-        </p:nvSpPr>
-        <p:spPr/>
-        <p:txBody>
-          <a:bodyPr/>
-          <a:lstStyle/>
-          <a:p>
-            <a:endParaRPr lang="zh-CN" altLang="en-US" dirty="0"/>
-          </a:p>
-        </p:txBody>
-      </p:sp>
-      <p:sp>
-        <p:nvSpPr>
-          <p:cNvPr id="4" name="灯片编号占位符 3"/>
-          <p:cNvSpPr>
-            <a:spLocks noGrp="1"/>
-          </p:cNvSpPr>
-          <p:nvPr>
-            <p:ph type="sldNum" sz="quarter" idx="5"/>
-          </p:nvPr>
-        </p:nvSpPr>
-        <p:spPr/>
-        <p:txBody>
-          <a:bodyPr/>
-          <a:lstStyle/>
-          <a:p>
-            <a:fld id="{84D44B96-76E6-40D2-B35B-1472F7BD7205}" type="slidenum">
-              <a:rPr lang="zh-CN" altLang="en-US" smtClean="0"/>
               <a:t>21</a:t>
-            </a:fld>
-            <a:endParaRPr lang="zh-CN" altLang="en-US"/>
-          </a:p>
-        </p:txBody>
-      </p:sp>
-    </p:spTree>
-    <p:extLst>
-      <p:ext uri="{BB962C8B-B14F-4D97-AF65-F5344CB8AC3E}">
-        <p14:creationId xmlns:p14="http://schemas.microsoft.com/office/powerpoint/2010/main" val="2589082743"/>
-      </p:ext>
-    </p:extLst>
-  </p:cSld>
-  <p:clrMapOvr>
-    <a:masterClrMapping/>
-  </p:clrMapOvr>
-</p:notes>
-</file>
-
-<file path=ppt/notesSlides/notesSlide13.xml><?xml version="1.0" encoding="utf-8"?>
-<p:notes xmlns:a="http://schemas.openxmlformats.org/drawingml/2006/main" xmlns:r="http://schemas.openxmlformats.org/officeDocument/2006/relationships" xmlns:p="http://schemas.openxmlformats.org/presentationml/2006/main">
-  <p:cSld>
-    <p:spTree>
-      <p:nvGrpSpPr>
-        <p:cNvPr id="1" name=""/>
-        <p:cNvGrpSpPr/>
-        <p:nvPr/>
-      </p:nvGrpSpPr>
-      <p:grpSpPr>
-        <a:xfrm>
-          <a:off x="0" y="0"/>
-          <a:ext cx="0" cy="0"/>
-          <a:chOff x="0" y="0"/>
-          <a:chExt cx="0" cy="0"/>
-        </a:xfrm>
-      </p:grpSpPr>
-      <p:sp>
-        <p:nvSpPr>
-          <p:cNvPr id="2" name="幻灯片图像占位符 1"/>
-          <p:cNvSpPr>
-            <a:spLocks noGrp="1" noRot="1" noChangeAspect="1"/>
-          </p:cNvSpPr>
-          <p:nvPr>
-            <p:ph type="sldImg"/>
-          </p:nvPr>
-        </p:nvSpPr>
-        <p:spPr/>
-      </p:sp>
-      <p:sp>
-        <p:nvSpPr>
-          <p:cNvPr id="3" name="备注占位符 2"/>
-          <p:cNvSpPr>
-            <a:spLocks noGrp="1"/>
-          </p:cNvSpPr>
-          <p:nvPr>
-            <p:ph type="body" idx="1"/>
-          </p:nvPr>
-        </p:nvSpPr>
-        <p:spPr/>
-        <p:txBody>
-          <a:bodyPr/>
-          <a:lstStyle/>
-          <a:p>
-            <a:endParaRPr lang="zh-CN" altLang="en-US" dirty="0"/>
-          </a:p>
-        </p:txBody>
-      </p:sp>
-      <p:sp>
-        <p:nvSpPr>
-          <p:cNvPr id="4" name="灯片编号占位符 3"/>
-          <p:cNvSpPr>
-            <a:spLocks noGrp="1"/>
-          </p:cNvSpPr>
-          <p:nvPr>
-            <p:ph type="sldNum" sz="quarter" idx="5"/>
-          </p:nvPr>
-        </p:nvSpPr>
-        <p:spPr/>
-        <p:txBody>
-          <a:bodyPr/>
-          <a:lstStyle/>
-          <a:p>
-            <a:fld id="{84D44B96-76E6-40D2-B35B-1472F7BD7205}" type="slidenum">
-              <a:rPr lang="zh-CN" altLang="en-US" smtClean="0"/>
-              <a:t>24</a:t>
             </a:fld>
             <a:endParaRPr lang="zh-CN" altLang="en-US"/>
           </a:p>
@@ -8463,1251 +8205,6 @@
           </a:p>
         </p:txBody>
       </p:sp>
-      <p:pic>
-        <p:nvPicPr>
-          <p:cNvPr id="9" name="图片 8">
-            <a:extLst>
-              <a:ext uri="{FF2B5EF4-FFF2-40B4-BE49-F238E27FC236}">
-                <a16:creationId xmlns:a16="http://schemas.microsoft.com/office/drawing/2014/main" id="{9EDF0D45-A304-4E11-A02B-7791AD315D84}"/>
-              </a:ext>
-            </a:extLst>
-          </p:cNvPr>
-          <p:cNvPicPr>
-            <a:picLocks noChangeAspect="1"/>
-          </p:cNvPicPr>
-          <p:nvPr/>
-        </p:nvPicPr>
-        <p:blipFill>
-          <a:blip r:embed="rId3"/>
-          <a:stretch>
-            <a:fillRect/>
-          </a:stretch>
-        </p:blipFill>
-        <p:spPr>
-          <a:xfrm>
-            <a:off x="649375" y="2295326"/>
-            <a:ext cx="10893249" cy="3803610"/>
-          </a:xfrm>
-          <a:prstGeom prst="rect">
-            <a:avLst/>
-          </a:prstGeom>
-        </p:spPr>
-      </p:pic>
-      <p:sp>
-        <p:nvSpPr>
-          <p:cNvPr id="6" name="文本框 5">
-            <a:extLst>
-              <a:ext uri="{FF2B5EF4-FFF2-40B4-BE49-F238E27FC236}">
-                <a16:creationId xmlns:a16="http://schemas.microsoft.com/office/drawing/2014/main" id="{615DFF5E-8BFB-4563-9F23-350EA3013595}"/>
-              </a:ext>
-            </a:extLst>
-          </p:cNvPr>
-          <p:cNvSpPr txBox="1"/>
-          <p:nvPr/>
-        </p:nvSpPr>
-        <p:spPr>
-          <a:xfrm>
-            <a:off x="460552" y="1128030"/>
-            <a:ext cx="10893248" cy="1323439"/>
-          </a:xfrm>
-          <a:prstGeom prst="rect">
-            <a:avLst/>
-          </a:prstGeom>
-          <a:noFill/>
-        </p:spPr>
-        <p:txBody>
-          <a:bodyPr wrap="square" rtlCol="0">
-            <a:spAutoFit/>
-          </a:bodyPr>
-          <a:lstStyle/>
-          <a:p>
-            <a:r>
-              <a:rPr lang="en-US" altLang="zh-CN" sz="2000" b="1" dirty="0">
-                <a:solidFill>
-                  <a:schemeClr val="accent6"/>
-                </a:solidFill>
-              </a:rPr>
-              <a:t>B. Performance Comparison upon Federated Learning: </a:t>
-            </a:r>
-            <a:r>
-              <a:rPr lang="en-US" altLang="zh-CN" sz="2000" dirty="0"/>
-              <a:t>The performance of different models, including </a:t>
-            </a:r>
-            <a:r>
-              <a:rPr lang="en-US" altLang="zh-CN" sz="2000" i="1" dirty="0"/>
-              <a:t>FL-MLP, FL-CNN,FL-GRU and FL-CNN-GRU, </a:t>
-            </a:r>
-            <a:r>
-              <a:rPr lang="en-US" altLang="zh-CN" sz="2000" dirty="0"/>
-              <a:t>upon different number of industrial agents.</a:t>
-            </a:r>
-          </a:p>
-          <a:p>
-            <a:endParaRPr lang="en-US" altLang="zh-CN" sz="2000" dirty="0"/>
-          </a:p>
-        </p:txBody>
-      </p:sp>
-    </p:spTree>
-    <p:extLst>
-      <p:ext uri="{BB962C8B-B14F-4D97-AF65-F5344CB8AC3E}">
-        <p14:creationId xmlns:p14="http://schemas.microsoft.com/office/powerpoint/2010/main" val="600810057"/>
-      </p:ext>
-    </p:extLst>
-  </p:cSld>
-  <p:clrMapOvr>
-    <a:masterClrMapping/>
-  </p:clrMapOvr>
-  <mc:AlternateContent xmlns:mc="http://schemas.openxmlformats.org/markup-compatibility/2006" xmlns:p14="http://schemas.microsoft.com/office/powerpoint/2010/main">
-    <mc:Choice Requires="p14">
-      <p:transition spd="med" p14:dur="700">
-        <p:fade/>
-      </p:transition>
-    </mc:Choice>
-    <mc:Fallback xmlns="">
-      <p:transition spd="med">
-        <p:fade/>
-      </p:transition>
-    </mc:Fallback>
-  </mc:AlternateContent>
-</p:sld>
-</file>
-
-<file path=ppt/slides/slide2.xml><?xml version="1.0" encoding="utf-8"?>
-<p:sld xmlns:a="http://schemas.openxmlformats.org/drawingml/2006/main" xmlns:r="http://schemas.openxmlformats.org/officeDocument/2006/relationships" xmlns:p="http://schemas.openxmlformats.org/presentationml/2006/main">
-  <p:cSld>
-    <p:spTree>
-      <p:nvGrpSpPr>
-        <p:cNvPr id="1" name=""/>
-        <p:cNvGrpSpPr/>
-        <p:nvPr/>
-      </p:nvGrpSpPr>
-      <p:grpSpPr>
-        <a:xfrm>
-          <a:off x="0" y="0"/>
-          <a:ext cx="0" cy="0"/>
-          <a:chOff x="0" y="0"/>
-          <a:chExt cx="0" cy="0"/>
-        </a:xfrm>
-      </p:grpSpPr>
-      <p:sp>
-        <p:nvSpPr>
-          <p:cNvPr id="3" name="标题 2">
-            <a:extLst>
-              <a:ext uri="{FF2B5EF4-FFF2-40B4-BE49-F238E27FC236}">
-                <a16:creationId xmlns:a16="http://schemas.microsoft.com/office/drawing/2014/main" id="{2330ED93-A5C9-431C-AA9A-3644DCB8952A}"/>
-              </a:ext>
-            </a:extLst>
-          </p:cNvPr>
-          <p:cNvSpPr>
-            <a:spLocks noGrp="1"/>
-          </p:cNvSpPr>
-          <p:nvPr>
-            <p:ph type="title"/>
-          </p:nvPr>
-        </p:nvSpPr>
-        <p:spPr>
-          <a:xfrm>
-            <a:off x="287975" y="196417"/>
-            <a:ext cx="9306962" cy="599151"/>
-          </a:xfrm>
-        </p:spPr>
-        <p:txBody>
-          <a:bodyPr>
-            <a:normAutofit fontScale="90000"/>
-          </a:bodyPr>
-          <a:lstStyle/>
-          <a:p>
-            <a:r>
-              <a:rPr lang="en-US" altLang="zh-CN" dirty="0"/>
-              <a:t>Federated Learning in Cybersecurity: Applications and Challenges</a:t>
-            </a:r>
-            <a:endParaRPr lang="zh-CN" altLang="en-US" dirty="0"/>
-          </a:p>
-        </p:txBody>
-      </p:sp>
-      <p:sp>
-        <p:nvSpPr>
-          <p:cNvPr id="2" name="灯片编号占位符 1">
-            <a:extLst>
-              <a:ext uri="{FF2B5EF4-FFF2-40B4-BE49-F238E27FC236}">
-                <a16:creationId xmlns:a16="http://schemas.microsoft.com/office/drawing/2014/main" id="{EBBA0B96-FC52-450F-88F4-2D0914D5B316}"/>
-              </a:ext>
-            </a:extLst>
-          </p:cNvPr>
-          <p:cNvSpPr>
-            <a:spLocks noGrp="1"/>
-          </p:cNvSpPr>
-          <p:nvPr>
-            <p:ph type="sldNum" sz="quarter" idx="12"/>
-          </p:nvPr>
-        </p:nvSpPr>
-        <p:spPr/>
-        <p:txBody>
-          <a:bodyPr/>
-          <a:lstStyle/>
-          <a:p>
-            <a:fld id="{565CE74E-AB26-4998-AD42-012C4C1AD076}" type="slidenum">
-              <a:rPr lang="zh-CN" altLang="en-US" smtClean="0"/>
-              <a:t>2</a:t>
-            </a:fld>
-            <a:endParaRPr lang="zh-CN" altLang="en-US"/>
-          </a:p>
-        </p:txBody>
-      </p:sp>
-      <p:sp>
-        <p:nvSpPr>
-          <p:cNvPr id="4" name="标题 2">
-            <a:extLst>
-              <a:ext uri="{FF2B5EF4-FFF2-40B4-BE49-F238E27FC236}">
-                <a16:creationId xmlns:a16="http://schemas.microsoft.com/office/drawing/2014/main" id="{88C0C30C-8E7D-4885-97C8-8AF53AC3128E}"/>
-              </a:ext>
-            </a:extLst>
-          </p:cNvPr>
-          <p:cNvSpPr txBox="1">
-            <a:spLocks/>
-          </p:cNvSpPr>
-          <p:nvPr/>
-        </p:nvSpPr>
-        <p:spPr>
-          <a:xfrm>
-            <a:off x="0" y="1912330"/>
-            <a:ext cx="11084560" cy="1697112"/>
-          </a:xfrm>
-          <a:prstGeom prst="rect">
-            <a:avLst/>
-          </a:prstGeom>
-        </p:spPr>
-        <p:txBody>
-          <a:bodyPr vert="horz" lIns="91440" tIns="45720" rIns="91440" bIns="45720" rtlCol="0" anchor="ctr">
-            <a:noAutofit/>
-          </a:bodyPr>
-          <a:lstStyle>
-            <a:lvl1pPr algn="l" defTabSz="914400" rtl="0" eaLnBrk="1" latinLnBrk="0" hangingPunct="1">
-              <a:lnSpc>
-                <a:spcPct val="90000"/>
-              </a:lnSpc>
-              <a:spcBef>
-                <a:spcPct val="0"/>
-              </a:spcBef>
-              <a:buNone/>
-              <a:defRPr sz="2400" kern="1200">
-                <a:solidFill>
-                  <a:schemeClr val="bg1"/>
-                </a:solidFill>
-                <a:latin typeface="+mj-lt"/>
-                <a:ea typeface="+mj-ea"/>
-                <a:cs typeface="+mj-cs"/>
-              </a:defRPr>
-            </a:lvl1pPr>
-          </a:lstStyle>
-          <a:p>
-            <a:pPr>
-              <a:lnSpc>
-                <a:spcPct val="120000"/>
-              </a:lnSpc>
-            </a:pPr>
-            <a:r>
-              <a:rPr lang="en-US" altLang="zh-CN" sz="3800" b="1" dirty="0">
-                <a:solidFill>
-                  <a:srgbClr val="C00000"/>
-                </a:solidFill>
-                <a:latin typeface="+mn-ea"/>
-                <a:ea typeface="+mn-ea"/>
-              </a:rPr>
-              <a:t>Security Challenges in Federated Learning:</a:t>
-            </a:r>
-          </a:p>
-          <a:p>
-            <a:pPr>
-              <a:lnSpc>
-                <a:spcPct val="120000"/>
-              </a:lnSpc>
-            </a:pPr>
-            <a:r>
-              <a:rPr lang="en-US" altLang="zh-CN" sz="3800" b="1" dirty="0">
-                <a:solidFill>
-                  <a:srgbClr val="C00000"/>
-                </a:solidFill>
-                <a:latin typeface="+mn-ea"/>
-                <a:ea typeface="+mn-ea"/>
-              </a:rPr>
-              <a:t>Byzantine</a:t>
-            </a:r>
-            <a:r>
-              <a:rPr lang="zh-CN" altLang="en-US" sz="3800" b="1" dirty="0">
-                <a:solidFill>
-                  <a:srgbClr val="C00000"/>
-                </a:solidFill>
-                <a:latin typeface="+mn-ea"/>
-                <a:ea typeface="+mn-ea"/>
-              </a:rPr>
-              <a:t> </a:t>
-            </a:r>
-            <a:r>
-              <a:rPr lang="en-US" altLang="zh-CN" sz="3800" b="1" dirty="0">
-                <a:solidFill>
-                  <a:srgbClr val="C00000"/>
-                </a:solidFill>
-                <a:latin typeface="+mn-ea"/>
-                <a:ea typeface="+mn-ea"/>
-              </a:rPr>
-              <a:t>Attack and Defense</a:t>
-            </a:r>
-          </a:p>
-        </p:txBody>
-      </p:sp>
-      <p:sp>
-        <p:nvSpPr>
-          <p:cNvPr id="5" name="标题 2">
-            <a:extLst>
-              <a:ext uri="{FF2B5EF4-FFF2-40B4-BE49-F238E27FC236}">
-                <a16:creationId xmlns:a16="http://schemas.microsoft.com/office/drawing/2014/main" id="{A449B837-2657-4236-85EA-F912DBF7D533}"/>
-              </a:ext>
-            </a:extLst>
-          </p:cNvPr>
-          <p:cNvSpPr txBox="1">
-            <a:spLocks/>
-          </p:cNvSpPr>
-          <p:nvPr/>
-        </p:nvSpPr>
-        <p:spPr>
-          <a:xfrm>
-            <a:off x="0" y="4268862"/>
-            <a:ext cx="10997852" cy="1697112"/>
-          </a:xfrm>
-          <a:prstGeom prst="rect">
-            <a:avLst/>
-          </a:prstGeom>
-        </p:spPr>
-        <p:txBody>
-          <a:bodyPr vert="horz" lIns="91440" tIns="45720" rIns="91440" bIns="45720" rtlCol="0" anchor="ctr">
-            <a:noAutofit/>
-          </a:bodyPr>
-          <a:lstStyle>
-            <a:lvl1pPr algn="l" defTabSz="914400" rtl="0" eaLnBrk="1" latinLnBrk="0" hangingPunct="1">
-              <a:lnSpc>
-                <a:spcPct val="90000"/>
-              </a:lnSpc>
-              <a:spcBef>
-                <a:spcPct val="0"/>
-              </a:spcBef>
-              <a:buNone/>
-              <a:defRPr sz="2400" kern="1200">
-                <a:solidFill>
-                  <a:schemeClr val="bg1"/>
-                </a:solidFill>
-                <a:latin typeface="+mj-lt"/>
-                <a:ea typeface="+mj-ea"/>
-                <a:cs typeface="+mj-cs"/>
-              </a:defRPr>
-            </a:lvl1pPr>
-          </a:lstStyle>
-          <a:p>
-            <a:pPr>
-              <a:lnSpc>
-                <a:spcPct val="120000"/>
-              </a:lnSpc>
-            </a:pPr>
-            <a:r>
-              <a:rPr lang="en-US" altLang="zh-CN" sz="2000" dirty="0" err="1">
-                <a:solidFill>
-                  <a:schemeClr val="tx1"/>
-                </a:solidFill>
-                <a:latin typeface="+mn-ea"/>
-                <a:ea typeface="+mn-ea"/>
-              </a:rPr>
-              <a:t>FLPhish</a:t>
-            </a:r>
-            <a:r>
-              <a:rPr lang="en-US" altLang="zh-CN" sz="2000" dirty="0">
-                <a:solidFill>
-                  <a:schemeClr val="tx1"/>
-                </a:solidFill>
-                <a:latin typeface="+mn-ea"/>
-                <a:ea typeface="+mn-ea"/>
-              </a:rPr>
-              <a:t>: Reputation-based Phishing Byzantine Defense in Ensemble Federated Learning</a:t>
-            </a:r>
-          </a:p>
-          <a:p>
-            <a:pPr>
-              <a:lnSpc>
-                <a:spcPct val="120000"/>
-              </a:lnSpc>
-            </a:pPr>
-            <a:r>
-              <a:rPr lang="en-US" altLang="zh-CN" sz="2000" b="1" dirty="0">
-                <a:solidFill>
-                  <a:schemeClr val="tx1"/>
-                </a:solidFill>
-                <a:latin typeface="+mn-ea"/>
-                <a:ea typeface="+mn-ea"/>
-              </a:rPr>
-              <a:t>Beibei Li</a:t>
-            </a:r>
-            <a:r>
-              <a:rPr lang="en-US" altLang="zh-CN" sz="2000" dirty="0">
-                <a:solidFill>
-                  <a:schemeClr val="tx1"/>
-                </a:solidFill>
-                <a:latin typeface="+mn-ea"/>
-                <a:ea typeface="+mn-ea"/>
-              </a:rPr>
-              <a:t>, </a:t>
-            </a:r>
-            <a:r>
-              <a:rPr lang="en-US" altLang="zh-CN" sz="2000" dirty="0" err="1">
-                <a:solidFill>
-                  <a:schemeClr val="tx1"/>
-                </a:solidFill>
-                <a:latin typeface="+mn-ea"/>
-                <a:ea typeface="+mn-ea"/>
-              </a:rPr>
-              <a:t>Peiran</a:t>
-            </a:r>
-            <a:r>
-              <a:rPr lang="en-US" altLang="zh-CN" sz="2000" dirty="0">
-                <a:solidFill>
-                  <a:schemeClr val="tx1"/>
-                </a:solidFill>
-                <a:latin typeface="+mn-ea"/>
-                <a:ea typeface="+mn-ea"/>
-              </a:rPr>
-              <a:t> Wang, </a:t>
-            </a:r>
-            <a:r>
-              <a:rPr lang="en-US" altLang="zh-CN" sz="2000" dirty="0" err="1">
-                <a:solidFill>
-                  <a:schemeClr val="tx1"/>
-                </a:solidFill>
-                <a:latin typeface="+mn-ea"/>
-                <a:ea typeface="+mn-ea"/>
-              </a:rPr>
-              <a:t>Hanyuan</a:t>
-            </a:r>
-            <a:r>
-              <a:rPr lang="en-US" altLang="zh-CN" sz="2000" dirty="0">
-                <a:solidFill>
-                  <a:schemeClr val="tx1"/>
-                </a:solidFill>
-                <a:latin typeface="+mn-ea"/>
-                <a:ea typeface="+mn-ea"/>
-              </a:rPr>
-              <a:t> Huang, Shang Ma, and </a:t>
-            </a:r>
-            <a:r>
-              <a:rPr lang="en-US" altLang="zh-CN" sz="2000" dirty="0" err="1">
-                <a:solidFill>
-                  <a:schemeClr val="tx1"/>
-                </a:solidFill>
-                <a:latin typeface="+mn-ea"/>
-                <a:ea typeface="+mn-ea"/>
-              </a:rPr>
-              <a:t>Yukun</a:t>
-            </a:r>
-            <a:r>
-              <a:rPr lang="en-US" altLang="zh-CN" sz="2000" dirty="0">
-                <a:solidFill>
-                  <a:schemeClr val="tx1"/>
-                </a:solidFill>
-                <a:latin typeface="+mn-ea"/>
-                <a:ea typeface="+mn-ea"/>
-              </a:rPr>
-              <a:t> Jiang</a:t>
-            </a:r>
-          </a:p>
-          <a:p>
-            <a:pPr>
-              <a:lnSpc>
-                <a:spcPct val="120000"/>
-              </a:lnSpc>
-            </a:pPr>
-            <a:r>
-              <a:rPr lang="en-US" altLang="zh-CN" sz="2000" b="1" dirty="0">
-                <a:solidFill>
-                  <a:srgbClr val="C00000"/>
-                </a:solidFill>
-                <a:latin typeface="+mn-ea"/>
-                <a:ea typeface="+mn-ea"/>
-              </a:rPr>
-              <a:t>Best Paper Award </a:t>
-            </a:r>
-            <a:r>
-              <a:rPr lang="en-US" altLang="zh-CN" sz="2000" dirty="0">
-                <a:solidFill>
-                  <a:schemeClr val="tx1"/>
-                </a:solidFill>
-                <a:latin typeface="+mn-ea"/>
-                <a:ea typeface="+mn-ea"/>
-              </a:rPr>
-              <a:t>in IEEE symposium on Computers and Communications’</a:t>
-            </a:r>
-            <a:r>
-              <a:rPr lang="zh-CN" altLang="en-US" sz="2000" dirty="0">
-                <a:solidFill>
-                  <a:schemeClr val="tx1"/>
-                </a:solidFill>
-                <a:latin typeface="+mn-ea"/>
-                <a:ea typeface="+mn-ea"/>
-              </a:rPr>
-              <a:t> </a:t>
-            </a:r>
-            <a:r>
-              <a:rPr lang="en-US" altLang="zh-CN" sz="2000" dirty="0">
-                <a:solidFill>
-                  <a:schemeClr val="tx1"/>
-                </a:solidFill>
-                <a:latin typeface="+mn-ea"/>
-                <a:ea typeface="+mn-ea"/>
-              </a:rPr>
-              <a:t>2021</a:t>
-            </a:r>
-          </a:p>
-        </p:txBody>
-      </p:sp>
-    </p:spTree>
-    <p:extLst>
-      <p:ext uri="{BB962C8B-B14F-4D97-AF65-F5344CB8AC3E}">
-        <p14:creationId xmlns:p14="http://schemas.microsoft.com/office/powerpoint/2010/main" val="780686075"/>
-      </p:ext>
-    </p:extLst>
-  </p:cSld>
-  <p:clrMapOvr>
-    <a:masterClrMapping/>
-  </p:clrMapOvr>
-  <mc:AlternateContent xmlns:mc="http://schemas.openxmlformats.org/markup-compatibility/2006" xmlns:p14="http://schemas.microsoft.com/office/powerpoint/2010/main">
-    <mc:Choice Requires="p14">
-      <p:transition spd="med" p14:dur="700">
-        <p:fade/>
-      </p:transition>
-    </mc:Choice>
-    <mc:Fallback xmlns="">
-      <p:transition spd="med">
-        <p:fade/>
-      </p:transition>
-    </mc:Fallback>
-  </mc:AlternateContent>
-</p:sld>
-</file>
-
-<file path=ppt/slides/slide20.xml><?xml version="1.0" encoding="utf-8"?>
-<p:sld xmlns:a="http://schemas.openxmlformats.org/drawingml/2006/main" xmlns:r="http://schemas.openxmlformats.org/officeDocument/2006/relationships" xmlns:p="http://schemas.openxmlformats.org/presentationml/2006/main">
-  <p:cSld>
-    <p:spTree>
-      <p:nvGrpSpPr>
-        <p:cNvPr id="1" name=""/>
-        <p:cNvGrpSpPr/>
-        <p:nvPr/>
-      </p:nvGrpSpPr>
-      <p:grpSpPr>
-        <a:xfrm>
-          <a:off x="0" y="0"/>
-          <a:ext cx="0" cy="0"/>
-          <a:chOff x="0" y="0"/>
-          <a:chExt cx="0" cy="0"/>
-        </a:xfrm>
-      </p:grpSpPr>
-      <p:sp>
-        <p:nvSpPr>
-          <p:cNvPr id="2" name="标题 1">
-            <a:extLst>
-              <a:ext uri="{FF2B5EF4-FFF2-40B4-BE49-F238E27FC236}">
-                <a16:creationId xmlns:a16="http://schemas.microsoft.com/office/drawing/2014/main" id="{759D3990-145C-47AD-A9E5-632DF5D8042C}"/>
-              </a:ext>
-            </a:extLst>
-          </p:cNvPr>
-          <p:cNvSpPr>
-            <a:spLocks noGrp="1"/>
-          </p:cNvSpPr>
-          <p:nvPr>
-            <p:ph type="title"/>
-          </p:nvPr>
-        </p:nvSpPr>
-        <p:spPr/>
-        <p:txBody>
-          <a:bodyPr/>
-          <a:lstStyle/>
-          <a:p>
-            <a:r>
-              <a:rPr lang="en-US" altLang="zh-CN" b="1" dirty="0"/>
-              <a:t>Ⅳ.</a:t>
-            </a:r>
-            <a:r>
-              <a:rPr lang="zh-CN" altLang="en-US" b="1" dirty="0"/>
-              <a:t> </a:t>
-            </a:r>
-            <a:r>
-              <a:rPr lang="en-US" altLang="zh-CN" b="1" dirty="0"/>
-              <a:t>Experiments and Evaluation</a:t>
-            </a:r>
-            <a:endParaRPr lang="zh-CN" altLang="en-US" dirty="0"/>
-          </a:p>
-        </p:txBody>
-      </p:sp>
-      <p:sp>
-        <p:nvSpPr>
-          <p:cNvPr id="4" name="灯片编号占位符 3">
-            <a:extLst>
-              <a:ext uri="{FF2B5EF4-FFF2-40B4-BE49-F238E27FC236}">
-                <a16:creationId xmlns:a16="http://schemas.microsoft.com/office/drawing/2014/main" id="{1CEAFCD5-D45E-491E-A464-874529050A66}"/>
-              </a:ext>
-            </a:extLst>
-          </p:cNvPr>
-          <p:cNvSpPr>
-            <a:spLocks noGrp="1"/>
-          </p:cNvSpPr>
-          <p:nvPr>
-            <p:ph type="sldNum" sz="quarter" idx="12"/>
-          </p:nvPr>
-        </p:nvSpPr>
-        <p:spPr/>
-        <p:txBody>
-          <a:bodyPr/>
-          <a:lstStyle/>
-          <a:p>
-            <a:fld id="{565CE74E-AB26-4998-AD42-012C4C1AD076}" type="slidenum">
-              <a:rPr lang="zh-CN" altLang="en-US" smtClean="0"/>
-              <a:pPr/>
-              <a:t>20</a:t>
-            </a:fld>
-            <a:endParaRPr lang="zh-CN" altLang="en-US"/>
-          </a:p>
-        </p:txBody>
-      </p:sp>
-      <p:sp>
-        <p:nvSpPr>
-          <p:cNvPr id="8" name="文本框 7">
-            <a:extLst>
-              <a:ext uri="{FF2B5EF4-FFF2-40B4-BE49-F238E27FC236}">
-                <a16:creationId xmlns:a16="http://schemas.microsoft.com/office/drawing/2014/main" id="{3F2500CC-04E1-4C62-8A22-2638634AEAD6}"/>
-              </a:ext>
-            </a:extLst>
-          </p:cNvPr>
-          <p:cNvSpPr txBox="1"/>
-          <p:nvPr/>
-        </p:nvSpPr>
-        <p:spPr>
-          <a:xfrm>
-            <a:off x="717956" y="1239512"/>
-            <a:ext cx="10756088" cy="1323439"/>
-          </a:xfrm>
-          <a:prstGeom prst="rect">
-            <a:avLst/>
-          </a:prstGeom>
-          <a:noFill/>
-        </p:spPr>
-        <p:txBody>
-          <a:bodyPr wrap="square" rtlCol="0">
-            <a:spAutoFit/>
-          </a:bodyPr>
-          <a:lstStyle/>
-          <a:p>
-            <a:r>
-              <a:rPr lang="en-US" altLang="zh-CN" sz="2000" b="1" dirty="0">
-                <a:solidFill>
-                  <a:schemeClr val="accent6"/>
-                </a:solidFill>
-              </a:rPr>
-              <a:t>B.  Performance Comparison upon Federated Learning: </a:t>
-            </a:r>
-            <a:r>
-              <a:rPr lang="en-US" altLang="zh-CN" sz="2000" dirty="0"/>
-              <a:t>The accuracy of different models upon different communication rounds in three scenarios (3 agents, 5 agents, 7 agents, respectively).</a:t>
-            </a:r>
-          </a:p>
-          <a:p>
-            <a:endParaRPr lang="en-US" altLang="zh-CN" sz="2000" dirty="0"/>
-          </a:p>
-        </p:txBody>
-      </p:sp>
-      <p:pic>
-        <p:nvPicPr>
-          <p:cNvPr id="6" name="图片 5">
-            <a:extLst>
-              <a:ext uri="{FF2B5EF4-FFF2-40B4-BE49-F238E27FC236}">
-                <a16:creationId xmlns:a16="http://schemas.microsoft.com/office/drawing/2014/main" id="{4420DF1F-8335-454A-BE13-26A143A866D1}"/>
-              </a:ext>
-            </a:extLst>
-          </p:cNvPr>
-          <p:cNvPicPr>
-            <a:picLocks noChangeAspect="1"/>
-          </p:cNvPicPr>
-          <p:nvPr/>
-        </p:nvPicPr>
-        <p:blipFill>
-          <a:blip r:embed="rId3" cstate="print">
-            <a:extLst>
-              <a:ext uri="{28A0092B-C50C-407E-A947-70E740481C1C}">
-                <a14:useLocalDpi xmlns:a14="http://schemas.microsoft.com/office/drawing/2010/main" val="0"/>
-              </a:ext>
-            </a:extLst>
-          </a:blip>
-          <a:stretch>
-            <a:fillRect/>
-          </a:stretch>
-        </p:blipFill>
-        <p:spPr>
-          <a:xfrm>
-            <a:off x="213652" y="2345202"/>
-            <a:ext cx="3921565" cy="2941173"/>
-          </a:xfrm>
-          <a:prstGeom prst="rect">
-            <a:avLst/>
-          </a:prstGeom>
-        </p:spPr>
-      </p:pic>
-      <p:pic>
-        <p:nvPicPr>
-          <p:cNvPr id="7" name="图片 6">
-            <a:extLst>
-              <a:ext uri="{FF2B5EF4-FFF2-40B4-BE49-F238E27FC236}">
-                <a16:creationId xmlns:a16="http://schemas.microsoft.com/office/drawing/2014/main" id="{2718CC38-7223-4B1F-9D5D-5DE48BE95D4F}"/>
-              </a:ext>
-            </a:extLst>
-          </p:cNvPr>
-          <p:cNvPicPr>
-            <a:picLocks noChangeAspect="1"/>
-          </p:cNvPicPr>
-          <p:nvPr/>
-        </p:nvPicPr>
-        <p:blipFill>
-          <a:blip r:embed="rId4" cstate="print">
-            <a:extLst>
-              <a:ext uri="{28A0092B-C50C-407E-A947-70E740481C1C}">
-                <a14:useLocalDpi xmlns:a14="http://schemas.microsoft.com/office/drawing/2010/main" val="0"/>
-              </a:ext>
-            </a:extLst>
-          </a:blip>
-          <a:stretch>
-            <a:fillRect/>
-          </a:stretch>
-        </p:blipFill>
-        <p:spPr>
-          <a:xfrm>
-            <a:off x="4135217" y="2345201"/>
-            <a:ext cx="3921566" cy="2941174"/>
-          </a:xfrm>
-          <a:prstGeom prst="rect">
-            <a:avLst/>
-          </a:prstGeom>
-        </p:spPr>
-      </p:pic>
-      <p:pic>
-        <p:nvPicPr>
-          <p:cNvPr id="10" name="图片 9">
-            <a:extLst>
-              <a:ext uri="{FF2B5EF4-FFF2-40B4-BE49-F238E27FC236}">
-                <a16:creationId xmlns:a16="http://schemas.microsoft.com/office/drawing/2014/main" id="{3A1ED463-4B2E-45E3-8B0A-FB6548C74256}"/>
-              </a:ext>
-            </a:extLst>
-          </p:cNvPr>
-          <p:cNvPicPr>
-            <a:picLocks noChangeAspect="1"/>
-          </p:cNvPicPr>
-          <p:nvPr/>
-        </p:nvPicPr>
-        <p:blipFill>
-          <a:blip r:embed="rId5" cstate="print">
-            <a:extLst>
-              <a:ext uri="{28A0092B-C50C-407E-A947-70E740481C1C}">
-                <a14:useLocalDpi xmlns:a14="http://schemas.microsoft.com/office/drawing/2010/main" val="0"/>
-              </a:ext>
-            </a:extLst>
-          </a:blip>
-          <a:stretch>
-            <a:fillRect/>
-          </a:stretch>
-        </p:blipFill>
-        <p:spPr>
-          <a:xfrm>
-            <a:off x="8056782" y="2345200"/>
-            <a:ext cx="3921568" cy="2941175"/>
-          </a:xfrm>
-          <a:prstGeom prst="rect">
-            <a:avLst/>
-          </a:prstGeom>
-        </p:spPr>
-      </p:pic>
-    </p:spTree>
-    <p:extLst>
-      <p:ext uri="{BB962C8B-B14F-4D97-AF65-F5344CB8AC3E}">
-        <p14:creationId xmlns:p14="http://schemas.microsoft.com/office/powerpoint/2010/main" val="1621524174"/>
-      </p:ext>
-    </p:extLst>
-  </p:cSld>
-  <p:clrMapOvr>
-    <a:masterClrMapping/>
-  </p:clrMapOvr>
-  <mc:AlternateContent xmlns:mc="http://schemas.openxmlformats.org/markup-compatibility/2006" xmlns:p14="http://schemas.microsoft.com/office/powerpoint/2010/main">
-    <mc:Choice Requires="p14">
-      <p:transition spd="med" p14:dur="700">
-        <p:fade/>
-      </p:transition>
-    </mc:Choice>
-    <mc:Fallback xmlns="">
-      <p:transition spd="med">
-        <p:fade/>
-      </p:transition>
-    </mc:Fallback>
-  </mc:AlternateContent>
-</p:sld>
-</file>
-
-<file path=ppt/slides/slide21.xml><?xml version="1.0" encoding="utf-8"?>
-<p:sld xmlns:a="http://schemas.openxmlformats.org/drawingml/2006/main" xmlns:r="http://schemas.openxmlformats.org/officeDocument/2006/relationships" xmlns:p="http://schemas.openxmlformats.org/presentationml/2006/main">
-  <p:cSld>
-    <p:spTree>
-      <p:nvGrpSpPr>
-        <p:cNvPr id="1" name=""/>
-        <p:cNvGrpSpPr/>
-        <p:nvPr/>
-      </p:nvGrpSpPr>
-      <p:grpSpPr>
-        <a:xfrm>
-          <a:off x="0" y="0"/>
-          <a:ext cx="0" cy="0"/>
-          <a:chOff x="0" y="0"/>
-          <a:chExt cx="0" cy="0"/>
-        </a:xfrm>
-      </p:grpSpPr>
-      <p:sp>
-        <p:nvSpPr>
-          <p:cNvPr id="2" name="标题 1">
-            <a:extLst>
-              <a:ext uri="{FF2B5EF4-FFF2-40B4-BE49-F238E27FC236}">
-                <a16:creationId xmlns:a16="http://schemas.microsoft.com/office/drawing/2014/main" id="{759D3990-145C-47AD-A9E5-632DF5D8042C}"/>
-              </a:ext>
-            </a:extLst>
-          </p:cNvPr>
-          <p:cNvSpPr>
-            <a:spLocks noGrp="1"/>
-          </p:cNvSpPr>
-          <p:nvPr>
-            <p:ph type="title"/>
-          </p:nvPr>
-        </p:nvSpPr>
-        <p:spPr/>
-        <p:txBody>
-          <a:bodyPr/>
-          <a:lstStyle/>
-          <a:p>
-            <a:r>
-              <a:rPr lang="en-US" altLang="zh-CN" b="1" dirty="0"/>
-              <a:t>Ⅳ.</a:t>
-            </a:r>
-            <a:r>
-              <a:rPr lang="zh-CN" altLang="en-US" b="1" dirty="0"/>
-              <a:t> </a:t>
-            </a:r>
-            <a:r>
-              <a:rPr lang="en-US" altLang="zh-CN" b="1" dirty="0"/>
-              <a:t>Experiments and Evaluation</a:t>
-            </a:r>
-            <a:endParaRPr lang="zh-CN" altLang="en-US" dirty="0"/>
-          </a:p>
-        </p:txBody>
-      </p:sp>
-      <p:sp>
-        <p:nvSpPr>
-          <p:cNvPr id="4" name="灯片编号占位符 3">
-            <a:extLst>
-              <a:ext uri="{FF2B5EF4-FFF2-40B4-BE49-F238E27FC236}">
-                <a16:creationId xmlns:a16="http://schemas.microsoft.com/office/drawing/2014/main" id="{1CEAFCD5-D45E-491E-A464-874529050A66}"/>
-              </a:ext>
-            </a:extLst>
-          </p:cNvPr>
-          <p:cNvSpPr>
-            <a:spLocks noGrp="1"/>
-          </p:cNvSpPr>
-          <p:nvPr>
-            <p:ph type="sldNum" sz="quarter" idx="12"/>
-          </p:nvPr>
-        </p:nvSpPr>
-        <p:spPr/>
-        <p:txBody>
-          <a:bodyPr/>
-          <a:lstStyle/>
-          <a:p>
-            <a:fld id="{565CE74E-AB26-4998-AD42-012C4C1AD076}" type="slidenum">
-              <a:rPr lang="zh-CN" altLang="en-US" smtClean="0"/>
-              <a:pPr/>
-              <a:t>21</a:t>
-            </a:fld>
-            <a:endParaRPr lang="zh-CN" altLang="en-US"/>
-          </a:p>
-        </p:txBody>
-      </p:sp>
-      <p:sp>
-        <p:nvSpPr>
-          <p:cNvPr id="8" name="文本框 7">
-            <a:extLst>
-              <a:ext uri="{FF2B5EF4-FFF2-40B4-BE49-F238E27FC236}">
-                <a16:creationId xmlns:a16="http://schemas.microsoft.com/office/drawing/2014/main" id="{3F2500CC-04E1-4C62-8A22-2638634AEAD6}"/>
-              </a:ext>
-            </a:extLst>
-          </p:cNvPr>
-          <p:cNvSpPr txBox="1"/>
-          <p:nvPr/>
-        </p:nvSpPr>
-        <p:spPr>
-          <a:xfrm>
-            <a:off x="717956" y="1239512"/>
-            <a:ext cx="10756088" cy="1323439"/>
-          </a:xfrm>
-          <a:prstGeom prst="rect">
-            <a:avLst/>
-          </a:prstGeom>
-          <a:noFill/>
-        </p:spPr>
-        <p:txBody>
-          <a:bodyPr wrap="square" rtlCol="0">
-            <a:spAutoFit/>
-          </a:bodyPr>
-          <a:lstStyle/>
-          <a:p>
-            <a:r>
-              <a:rPr lang="en-US" altLang="zh-CN" sz="2000" b="1" dirty="0">
-                <a:solidFill>
-                  <a:schemeClr val="accent6"/>
-                </a:solidFill>
-              </a:rPr>
-              <a:t>B. Performance Comparison upon Federated Learning: </a:t>
-            </a:r>
-            <a:r>
-              <a:rPr lang="en-US" altLang="zh-CN" sz="2000" dirty="0"/>
-              <a:t>The F-score of different models upon different communication rounds in three scenarios (3 agents, 5 agents, 7 agents, respectively).</a:t>
-            </a:r>
-          </a:p>
-          <a:p>
-            <a:endParaRPr lang="en-US" altLang="zh-CN" sz="2000" dirty="0"/>
-          </a:p>
-        </p:txBody>
-      </p:sp>
-      <p:pic>
-        <p:nvPicPr>
-          <p:cNvPr id="6" name="图片 5">
-            <a:extLst>
-              <a:ext uri="{FF2B5EF4-FFF2-40B4-BE49-F238E27FC236}">
-                <a16:creationId xmlns:a16="http://schemas.microsoft.com/office/drawing/2014/main" id="{4420DF1F-8335-454A-BE13-26A143A866D1}"/>
-              </a:ext>
-            </a:extLst>
-          </p:cNvPr>
-          <p:cNvPicPr>
-            <a:picLocks noChangeAspect="1"/>
-          </p:cNvPicPr>
-          <p:nvPr/>
-        </p:nvPicPr>
-        <p:blipFill>
-          <a:blip r:embed="rId3" cstate="print">
-            <a:extLst>
-              <a:ext uri="{28A0092B-C50C-407E-A947-70E740481C1C}">
-                <a14:useLocalDpi xmlns:a14="http://schemas.microsoft.com/office/drawing/2010/main" val="0"/>
-              </a:ext>
-            </a:extLst>
-          </a:blip>
-          <a:stretch>
-            <a:fillRect/>
-          </a:stretch>
-        </p:blipFill>
-        <p:spPr>
-          <a:xfrm>
-            <a:off x="213652" y="2345202"/>
-            <a:ext cx="3921565" cy="2941173"/>
-          </a:xfrm>
-          <a:prstGeom prst="rect">
-            <a:avLst/>
-          </a:prstGeom>
-        </p:spPr>
-      </p:pic>
-      <p:pic>
-        <p:nvPicPr>
-          <p:cNvPr id="7" name="图片 6">
-            <a:extLst>
-              <a:ext uri="{FF2B5EF4-FFF2-40B4-BE49-F238E27FC236}">
-                <a16:creationId xmlns:a16="http://schemas.microsoft.com/office/drawing/2014/main" id="{2718CC38-7223-4B1F-9D5D-5DE48BE95D4F}"/>
-              </a:ext>
-            </a:extLst>
-          </p:cNvPr>
-          <p:cNvPicPr>
-            <a:picLocks noChangeAspect="1"/>
-          </p:cNvPicPr>
-          <p:nvPr/>
-        </p:nvPicPr>
-        <p:blipFill>
-          <a:blip r:embed="rId4" cstate="print">
-            <a:extLst>
-              <a:ext uri="{28A0092B-C50C-407E-A947-70E740481C1C}">
-                <a14:useLocalDpi xmlns:a14="http://schemas.microsoft.com/office/drawing/2010/main" val="0"/>
-              </a:ext>
-            </a:extLst>
-          </a:blip>
-          <a:stretch>
-            <a:fillRect/>
-          </a:stretch>
-        </p:blipFill>
-        <p:spPr>
-          <a:xfrm>
-            <a:off x="4135217" y="2345201"/>
-            <a:ext cx="3921566" cy="2941174"/>
-          </a:xfrm>
-          <a:prstGeom prst="rect">
-            <a:avLst/>
-          </a:prstGeom>
-        </p:spPr>
-      </p:pic>
-      <p:pic>
-        <p:nvPicPr>
-          <p:cNvPr id="10" name="图片 9">
-            <a:extLst>
-              <a:ext uri="{FF2B5EF4-FFF2-40B4-BE49-F238E27FC236}">
-                <a16:creationId xmlns:a16="http://schemas.microsoft.com/office/drawing/2014/main" id="{3A1ED463-4B2E-45E3-8B0A-FB6548C74256}"/>
-              </a:ext>
-            </a:extLst>
-          </p:cNvPr>
-          <p:cNvPicPr>
-            <a:picLocks noChangeAspect="1"/>
-          </p:cNvPicPr>
-          <p:nvPr/>
-        </p:nvPicPr>
-        <p:blipFill>
-          <a:blip r:embed="rId5" cstate="print">
-            <a:extLst>
-              <a:ext uri="{28A0092B-C50C-407E-A947-70E740481C1C}">
-                <a14:useLocalDpi xmlns:a14="http://schemas.microsoft.com/office/drawing/2010/main" val="0"/>
-              </a:ext>
-            </a:extLst>
-          </a:blip>
-          <a:stretch>
-            <a:fillRect/>
-          </a:stretch>
-        </p:blipFill>
-        <p:spPr>
-          <a:xfrm>
-            <a:off x="8056782" y="2345200"/>
-            <a:ext cx="3921568" cy="2941175"/>
-          </a:xfrm>
-          <a:prstGeom prst="rect">
-            <a:avLst/>
-          </a:prstGeom>
-        </p:spPr>
-      </p:pic>
-      <p:pic>
-        <p:nvPicPr>
-          <p:cNvPr id="5" name="图片 4">
-            <a:extLst>
-              <a:ext uri="{FF2B5EF4-FFF2-40B4-BE49-F238E27FC236}">
-                <a16:creationId xmlns:a16="http://schemas.microsoft.com/office/drawing/2014/main" id="{55614CFB-0D48-4AE4-BEDC-2D407ABC23AD}"/>
-              </a:ext>
-            </a:extLst>
-          </p:cNvPr>
-          <p:cNvPicPr>
-            <a:picLocks noChangeAspect="1"/>
-          </p:cNvPicPr>
-          <p:nvPr/>
-        </p:nvPicPr>
-        <p:blipFill>
-          <a:blip r:embed="rId6" cstate="print">
-            <a:extLst>
-              <a:ext uri="{28A0092B-C50C-407E-A947-70E740481C1C}">
-                <a14:useLocalDpi xmlns:a14="http://schemas.microsoft.com/office/drawing/2010/main" val="0"/>
-              </a:ext>
-            </a:extLst>
-          </a:blip>
-          <a:stretch>
-            <a:fillRect/>
-          </a:stretch>
-        </p:blipFill>
-        <p:spPr>
-          <a:xfrm>
-            <a:off x="213650" y="2334222"/>
-            <a:ext cx="3921564" cy="2941173"/>
-          </a:xfrm>
-          <a:prstGeom prst="rect">
-            <a:avLst/>
-          </a:prstGeom>
-        </p:spPr>
-      </p:pic>
-      <p:pic>
-        <p:nvPicPr>
-          <p:cNvPr id="11" name="图片 10">
-            <a:extLst>
-              <a:ext uri="{FF2B5EF4-FFF2-40B4-BE49-F238E27FC236}">
-                <a16:creationId xmlns:a16="http://schemas.microsoft.com/office/drawing/2014/main" id="{FB9271B1-31D8-4CE4-A283-309C9829B0E6}"/>
-              </a:ext>
-            </a:extLst>
-          </p:cNvPr>
-          <p:cNvPicPr>
-            <a:picLocks noChangeAspect="1"/>
-          </p:cNvPicPr>
-          <p:nvPr/>
-        </p:nvPicPr>
-        <p:blipFill>
-          <a:blip r:embed="rId7" cstate="print">
-            <a:extLst>
-              <a:ext uri="{28A0092B-C50C-407E-A947-70E740481C1C}">
-                <a14:useLocalDpi xmlns:a14="http://schemas.microsoft.com/office/drawing/2010/main" val="0"/>
-              </a:ext>
-            </a:extLst>
-          </a:blip>
-          <a:stretch>
-            <a:fillRect/>
-          </a:stretch>
-        </p:blipFill>
-        <p:spPr>
-          <a:xfrm>
-            <a:off x="4135217" y="2334222"/>
-            <a:ext cx="3921564" cy="2941173"/>
-          </a:xfrm>
-          <a:prstGeom prst="rect">
-            <a:avLst/>
-          </a:prstGeom>
-        </p:spPr>
-      </p:pic>
-      <p:pic>
-        <p:nvPicPr>
-          <p:cNvPr id="13" name="图片 12">
-            <a:extLst>
-              <a:ext uri="{FF2B5EF4-FFF2-40B4-BE49-F238E27FC236}">
-                <a16:creationId xmlns:a16="http://schemas.microsoft.com/office/drawing/2014/main" id="{4B3057EA-EB1F-4D10-8FED-BE8813C5F921}"/>
-              </a:ext>
-            </a:extLst>
-          </p:cNvPr>
-          <p:cNvPicPr>
-            <a:picLocks noChangeAspect="1"/>
-          </p:cNvPicPr>
-          <p:nvPr/>
-        </p:nvPicPr>
-        <p:blipFill>
-          <a:blip r:embed="rId8" cstate="print">
-            <a:extLst>
-              <a:ext uri="{28A0092B-C50C-407E-A947-70E740481C1C}">
-                <a14:useLocalDpi xmlns:a14="http://schemas.microsoft.com/office/drawing/2010/main" val="0"/>
-              </a:ext>
-            </a:extLst>
-          </a:blip>
-          <a:stretch>
-            <a:fillRect/>
-          </a:stretch>
-        </p:blipFill>
-        <p:spPr>
-          <a:xfrm>
-            <a:off x="8056784" y="2334222"/>
-            <a:ext cx="3921564" cy="2941173"/>
-          </a:xfrm>
-          <a:prstGeom prst="rect">
-            <a:avLst/>
-          </a:prstGeom>
-        </p:spPr>
-      </p:pic>
-    </p:spTree>
-    <p:extLst>
-      <p:ext uri="{BB962C8B-B14F-4D97-AF65-F5344CB8AC3E}">
-        <p14:creationId xmlns:p14="http://schemas.microsoft.com/office/powerpoint/2010/main" val="830379301"/>
-      </p:ext>
-    </p:extLst>
-  </p:cSld>
-  <p:clrMapOvr>
-    <a:masterClrMapping/>
-  </p:clrMapOvr>
-  <mc:AlternateContent xmlns:mc="http://schemas.openxmlformats.org/markup-compatibility/2006" xmlns:p14="http://schemas.microsoft.com/office/powerpoint/2010/main">
-    <mc:Choice Requires="p14">
-      <p:transition spd="med" p14:dur="700">
-        <p:fade/>
-      </p:transition>
-    </mc:Choice>
-    <mc:Fallback xmlns="">
-      <p:transition spd="med">
-        <p:fade/>
-      </p:transition>
-    </mc:Fallback>
-  </mc:AlternateContent>
-</p:sld>
-</file>
-
-<file path=ppt/slides/slide22.xml><?xml version="1.0" encoding="utf-8"?>
-<p:sld xmlns:a="http://schemas.openxmlformats.org/drawingml/2006/main" xmlns:r="http://schemas.openxmlformats.org/officeDocument/2006/relationships" xmlns:p="http://schemas.openxmlformats.org/presentationml/2006/main">
-  <p:cSld>
-    <p:spTree>
-      <p:nvGrpSpPr>
-        <p:cNvPr id="1" name=""/>
-        <p:cNvGrpSpPr/>
-        <p:nvPr/>
-      </p:nvGrpSpPr>
-      <p:grpSpPr>
-        <a:xfrm>
-          <a:off x="0" y="0"/>
-          <a:ext cx="0" cy="0"/>
-          <a:chOff x="0" y="0"/>
-          <a:chExt cx="0" cy="0"/>
-        </a:xfrm>
-      </p:grpSpPr>
-      <p:sp>
-        <p:nvSpPr>
-          <p:cNvPr id="2" name="标题 1">
-            <a:extLst>
-              <a:ext uri="{FF2B5EF4-FFF2-40B4-BE49-F238E27FC236}">
-                <a16:creationId xmlns:a16="http://schemas.microsoft.com/office/drawing/2014/main" id="{759D3990-145C-47AD-A9E5-632DF5D8042C}"/>
-              </a:ext>
-            </a:extLst>
-          </p:cNvPr>
-          <p:cNvSpPr>
-            <a:spLocks noGrp="1"/>
-          </p:cNvSpPr>
-          <p:nvPr>
-            <p:ph type="title"/>
-          </p:nvPr>
-        </p:nvSpPr>
-        <p:spPr/>
-        <p:txBody>
-          <a:bodyPr/>
-          <a:lstStyle/>
-          <a:p>
-            <a:r>
-              <a:rPr lang="en-US" altLang="zh-CN" b="1" dirty="0"/>
-              <a:t>Ⅳ.</a:t>
-            </a:r>
-            <a:r>
-              <a:rPr lang="zh-CN" altLang="en-US" b="1" dirty="0"/>
-              <a:t> </a:t>
-            </a:r>
-            <a:r>
-              <a:rPr lang="en-US" altLang="zh-CN" b="1" dirty="0"/>
-              <a:t>Experiments and Evaluation</a:t>
-            </a:r>
-            <a:endParaRPr lang="zh-CN" altLang="en-US" dirty="0"/>
-          </a:p>
-        </p:txBody>
-      </p:sp>
-      <p:sp>
-        <p:nvSpPr>
-          <p:cNvPr id="4" name="灯片编号占位符 3">
-            <a:extLst>
-              <a:ext uri="{FF2B5EF4-FFF2-40B4-BE49-F238E27FC236}">
-                <a16:creationId xmlns:a16="http://schemas.microsoft.com/office/drawing/2014/main" id="{1CEAFCD5-D45E-491E-A464-874529050A66}"/>
-              </a:ext>
-            </a:extLst>
-          </p:cNvPr>
-          <p:cNvSpPr>
-            <a:spLocks noGrp="1"/>
-          </p:cNvSpPr>
-          <p:nvPr>
-            <p:ph type="sldNum" sz="quarter" idx="12"/>
-          </p:nvPr>
-        </p:nvSpPr>
-        <p:spPr/>
-        <p:txBody>
-          <a:bodyPr/>
-          <a:lstStyle/>
-          <a:p>
-            <a:fld id="{565CE74E-AB26-4998-AD42-012C4C1AD076}" type="slidenum">
-              <a:rPr lang="zh-CN" altLang="en-US" smtClean="0"/>
-              <a:pPr/>
-              <a:t>22</a:t>
-            </a:fld>
-            <a:endParaRPr lang="zh-CN" altLang="en-US"/>
-          </a:p>
-        </p:txBody>
-      </p:sp>
       <p:sp>
         <p:nvSpPr>
           <p:cNvPr id="8" name="文本框 7">
@@ -9881,7 +8378,7 @@
 </p:sld>
 </file>
 
-<file path=ppt/slides/slide23.xml><?xml version="1.0" encoding="utf-8"?>
+<file path=ppt/slides/slide2.xml><?xml version="1.0" encoding="utf-8"?>
 <p:sld xmlns:a="http://schemas.openxmlformats.org/drawingml/2006/main" xmlns:r="http://schemas.openxmlformats.org/officeDocument/2006/relationships" xmlns:p="http://schemas.openxmlformats.org/presentationml/2006/main">
   <p:cSld>
     <p:spTree>
@@ -9900,6 +8397,424 @@
       </p:grpSpPr>
       <p:sp>
         <p:nvSpPr>
+          <p:cNvPr id="3" name="标题 2">
+            <a:extLst>
+              <a:ext uri="{FF2B5EF4-FFF2-40B4-BE49-F238E27FC236}">
+                <a16:creationId xmlns:a16="http://schemas.microsoft.com/office/drawing/2014/main" id="{2330ED93-A5C9-431C-AA9A-3644DCB8952A}"/>
+              </a:ext>
+            </a:extLst>
+          </p:cNvPr>
+          <p:cNvSpPr>
+            <a:spLocks noGrp="1"/>
+          </p:cNvSpPr>
+          <p:nvPr>
+            <p:ph type="title"/>
+          </p:nvPr>
+        </p:nvSpPr>
+        <p:spPr>
+          <a:xfrm>
+            <a:off x="287975" y="196417"/>
+            <a:ext cx="9306962" cy="599151"/>
+          </a:xfrm>
+        </p:spPr>
+        <p:txBody>
+          <a:bodyPr>
+            <a:normAutofit fontScale="90000"/>
+          </a:bodyPr>
+          <a:lstStyle/>
+          <a:p>
+            <a:r>
+              <a:rPr lang="en-US" altLang="zh-CN" dirty="0"/>
+              <a:t>Federated Learning in Cybersecurity: Applications and Challenges</a:t>
+            </a:r>
+            <a:endParaRPr lang="zh-CN" altLang="en-US" dirty="0"/>
+          </a:p>
+        </p:txBody>
+      </p:sp>
+      <p:sp>
+        <p:nvSpPr>
+          <p:cNvPr id="2" name="灯片编号占位符 1">
+            <a:extLst>
+              <a:ext uri="{FF2B5EF4-FFF2-40B4-BE49-F238E27FC236}">
+                <a16:creationId xmlns:a16="http://schemas.microsoft.com/office/drawing/2014/main" id="{EBBA0B96-FC52-450F-88F4-2D0914D5B316}"/>
+              </a:ext>
+            </a:extLst>
+          </p:cNvPr>
+          <p:cNvSpPr>
+            <a:spLocks noGrp="1"/>
+          </p:cNvSpPr>
+          <p:nvPr>
+            <p:ph type="sldNum" sz="quarter" idx="12"/>
+          </p:nvPr>
+        </p:nvSpPr>
+        <p:spPr/>
+        <p:txBody>
+          <a:bodyPr/>
+          <a:lstStyle/>
+          <a:p>
+            <a:fld id="{565CE74E-AB26-4998-AD42-012C4C1AD076}" type="slidenum">
+              <a:rPr lang="zh-CN" altLang="en-US" smtClean="0"/>
+              <a:t>2</a:t>
+            </a:fld>
+            <a:endParaRPr lang="zh-CN" altLang="en-US"/>
+          </a:p>
+        </p:txBody>
+      </p:sp>
+      <p:sp>
+        <p:nvSpPr>
+          <p:cNvPr id="4" name="标题 2">
+            <a:extLst>
+              <a:ext uri="{FF2B5EF4-FFF2-40B4-BE49-F238E27FC236}">
+                <a16:creationId xmlns:a16="http://schemas.microsoft.com/office/drawing/2014/main" id="{88C0C30C-8E7D-4885-97C8-8AF53AC3128E}"/>
+              </a:ext>
+            </a:extLst>
+          </p:cNvPr>
+          <p:cNvSpPr txBox="1">
+            <a:spLocks/>
+          </p:cNvSpPr>
+          <p:nvPr/>
+        </p:nvSpPr>
+        <p:spPr>
+          <a:xfrm>
+            <a:off x="0" y="1912330"/>
+            <a:ext cx="11084560" cy="1697112"/>
+          </a:xfrm>
+          <a:prstGeom prst="rect">
+            <a:avLst/>
+          </a:prstGeom>
+        </p:spPr>
+        <p:txBody>
+          <a:bodyPr vert="horz" lIns="91440" tIns="45720" rIns="91440" bIns="45720" rtlCol="0" anchor="ctr">
+            <a:noAutofit/>
+          </a:bodyPr>
+          <a:lstStyle>
+            <a:lvl1pPr algn="l" defTabSz="914400" rtl="0" eaLnBrk="1" latinLnBrk="0" hangingPunct="1">
+              <a:lnSpc>
+                <a:spcPct val="90000"/>
+              </a:lnSpc>
+              <a:spcBef>
+                <a:spcPct val="0"/>
+              </a:spcBef>
+              <a:buNone/>
+              <a:defRPr sz="2400" kern="1200">
+                <a:solidFill>
+                  <a:schemeClr val="bg1"/>
+                </a:solidFill>
+                <a:latin typeface="+mj-lt"/>
+                <a:ea typeface="+mj-ea"/>
+                <a:cs typeface="+mj-cs"/>
+              </a:defRPr>
+            </a:lvl1pPr>
+          </a:lstStyle>
+          <a:p>
+            <a:pPr>
+              <a:lnSpc>
+                <a:spcPct val="120000"/>
+              </a:lnSpc>
+            </a:pPr>
+            <a:r>
+              <a:rPr lang="en-US" altLang="zh-CN" sz="3800" b="1" dirty="0">
+                <a:solidFill>
+                  <a:srgbClr val="C00000"/>
+                </a:solidFill>
+                <a:latin typeface="+mn-ea"/>
+                <a:ea typeface="+mn-ea"/>
+              </a:rPr>
+              <a:t>Security Challenges in Federated Learning:</a:t>
+            </a:r>
+          </a:p>
+          <a:p>
+            <a:pPr>
+              <a:lnSpc>
+                <a:spcPct val="120000"/>
+              </a:lnSpc>
+            </a:pPr>
+            <a:r>
+              <a:rPr lang="en-US" altLang="zh-CN" sz="3800" b="1" dirty="0">
+                <a:solidFill>
+                  <a:srgbClr val="C00000"/>
+                </a:solidFill>
+                <a:latin typeface="+mn-ea"/>
+                <a:ea typeface="+mn-ea"/>
+              </a:rPr>
+              <a:t>Byzantine</a:t>
+            </a:r>
+            <a:r>
+              <a:rPr lang="zh-CN" altLang="en-US" sz="3800" b="1" dirty="0">
+                <a:solidFill>
+                  <a:srgbClr val="C00000"/>
+                </a:solidFill>
+                <a:latin typeface="+mn-ea"/>
+                <a:ea typeface="+mn-ea"/>
+              </a:rPr>
+              <a:t> </a:t>
+            </a:r>
+            <a:r>
+              <a:rPr lang="en-US" altLang="zh-CN" sz="3800" b="1" dirty="0">
+                <a:solidFill>
+                  <a:srgbClr val="C00000"/>
+                </a:solidFill>
+                <a:latin typeface="+mn-ea"/>
+                <a:ea typeface="+mn-ea"/>
+              </a:rPr>
+              <a:t>Attack and Defense</a:t>
+            </a:r>
+          </a:p>
+        </p:txBody>
+      </p:sp>
+      <p:sp>
+        <p:nvSpPr>
+          <p:cNvPr id="5" name="标题 2">
+            <a:extLst>
+              <a:ext uri="{FF2B5EF4-FFF2-40B4-BE49-F238E27FC236}">
+                <a16:creationId xmlns:a16="http://schemas.microsoft.com/office/drawing/2014/main" id="{A449B837-2657-4236-85EA-F912DBF7D533}"/>
+              </a:ext>
+            </a:extLst>
+          </p:cNvPr>
+          <p:cNvSpPr txBox="1">
+            <a:spLocks/>
+          </p:cNvSpPr>
+          <p:nvPr/>
+        </p:nvSpPr>
+        <p:spPr>
+          <a:xfrm>
+            <a:off x="0" y="4268862"/>
+            <a:ext cx="10997852" cy="1697112"/>
+          </a:xfrm>
+          <a:prstGeom prst="rect">
+            <a:avLst/>
+          </a:prstGeom>
+        </p:spPr>
+        <p:txBody>
+          <a:bodyPr vert="horz" lIns="91440" tIns="45720" rIns="91440" bIns="45720" rtlCol="0" anchor="ctr">
+            <a:noAutofit/>
+          </a:bodyPr>
+          <a:lstStyle>
+            <a:lvl1pPr algn="l" defTabSz="914400" rtl="0" eaLnBrk="1" latinLnBrk="0" hangingPunct="1">
+              <a:lnSpc>
+                <a:spcPct val="90000"/>
+              </a:lnSpc>
+              <a:spcBef>
+                <a:spcPct val="0"/>
+              </a:spcBef>
+              <a:buNone/>
+              <a:defRPr sz="2400" kern="1200">
+                <a:solidFill>
+                  <a:schemeClr val="bg1"/>
+                </a:solidFill>
+                <a:latin typeface="+mj-lt"/>
+                <a:ea typeface="+mj-ea"/>
+                <a:cs typeface="+mj-cs"/>
+              </a:defRPr>
+            </a:lvl1pPr>
+          </a:lstStyle>
+          <a:p>
+            <a:pPr>
+              <a:lnSpc>
+                <a:spcPct val="120000"/>
+              </a:lnSpc>
+            </a:pPr>
+            <a:r>
+              <a:rPr lang="en-US" altLang="zh-CN" sz="2000" dirty="0" err="1">
+                <a:solidFill>
+                  <a:schemeClr val="tx1"/>
+                </a:solidFill>
+                <a:latin typeface="+mn-ea"/>
+                <a:ea typeface="+mn-ea"/>
+              </a:rPr>
+              <a:t>FLPhish</a:t>
+            </a:r>
+            <a:r>
+              <a:rPr lang="en-US" altLang="zh-CN" sz="2000" dirty="0">
+                <a:solidFill>
+                  <a:schemeClr val="tx1"/>
+                </a:solidFill>
+                <a:latin typeface="+mn-ea"/>
+                <a:ea typeface="+mn-ea"/>
+              </a:rPr>
+              <a:t>: Reputation-based Phishing Byzantine Defense in Ensemble Federated Learning</a:t>
+            </a:r>
+          </a:p>
+          <a:p>
+            <a:pPr>
+              <a:lnSpc>
+                <a:spcPct val="120000"/>
+              </a:lnSpc>
+            </a:pPr>
+            <a:r>
+              <a:rPr lang="en-US" altLang="zh-CN" sz="2000" b="1" dirty="0">
+                <a:solidFill>
+                  <a:schemeClr val="tx1"/>
+                </a:solidFill>
+                <a:latin typeface="+mn-ea"/>
+                <a:ea typeface="+mn-ea"/>
+              </a:rPr>
+              <a:t>Beibei Li</a:t>
+            </a:r>
+            <a:r>
+              <a:rPr lang="en-US" altLang="zh-CN" sz="2000" dirty="0">
+                <a:solidFill>
+                  <a:schemeClr val="tx1"/>
+                </a:solidFill>
+                <a:latin typeface="+mn-ea"/>
+                <a:ea typeface="+mn-ea"/>
+              </a:rPr>
+              <a:t>, </a:t>
+            </a:r>
+            <a:r>
+              <a:rPr lang="en-US" altLang="zh-CN" sz="2000" dirty="0" err="1">
+                <a:solidFill>
+                  <a:schemeClr val="tx1"/>
+                </a:solidFill>
+                <a:latin typeface="+mn-ea"/>
+                <a:ea typeface="+mn-ea"/>
+              </a:rPr>
+              <a:t>Peiran</a:t>
+            </a:r>
+            <a:r>
+              <a:rPr lang="en-US" altLang="zh-CN" sz="2000" dirty="0">
+                <a:solidFill>
+                  <a:schemeClr val="tx1"/>
+                </a:solidFill>
+                <a:latin typeface="+mn-ea"/>
+                <a:ea typeface="+mn-ea"/>
+              </a:rPr>
+              <a:t> Wang, </a:t>
+            </a:r>
+            <a:r>
+              <a:rPr lang="en-US" altLang="zh-CN" sz="2000" dirty="0" err="1">
+                <a:solidFill>
+                  <a:schemeClr val="tx1"/>
+                </a:solidFill>
+                <a:latin typeface="+mn-ea"/>
+                <a:ea typeface="+mn-ea"/>
+              </a:rPr>
+              <a:t>Hanyuan</a:t>
+            </a:r>
+            <a:r>
+              <a:rPr lang="en-US" altLang="zh-CN" sz="2000" dirty="0">
+                <a:solidFill>
+                  <a:schemeClr val="tx1"/>
+                </a:solidFill>
+                <a:latin typeface="+mn-ea"/>
+                <a:ea typeface="+mn-ea"/>
+              </a:rPr>
+              <a:t> Huang, Shang Ma, and </a:t>
+            </a:r>
+            <a:r>
+              <a:rPr lang="en-US" altLang="zh-CN" sz="2000" dirty="0" err="1">
+                <a:solidFill>
+                  <a:schemeClr val="tx1"/>
+                </a:solidFill>
+                <a:latin typeface="+mn-ea"/>
+                <a:ea typeface="+mn-ea"/>
+              </a:rPr>
+              <a:t>Yukun</a:t>
+            </a:r>
+            <a:r>
+              <a:rPr lang="en-US" altLang="zh-CN" sz="2000" dirty="0">
+                <a:solidFill>
+                  <a:schemeClr val="tx1"/>
+                </a:solidFill>
+                <a:latin typeface="+mn-ea"/>
+                <a:ea typeface="+mn-ea"/>
+              </a:rPr>
+              <a:t> Jiang</a:t>
+            </a:r>
+          </a:p>
+          <a:p>
+            <a:pPr>
+              <a:lnSpc>
+                <a:spcPct val="120000"/>
+              </a:lnSpc>
+            </a:pPr>
+            <a:r>
+              <a:rPr lang="en-US" altLang="zh-CN" sz="2000" b="1" dirty="0">
+                <a:solidFill>
+                  <a:srgbClr val="C00000"/>
+                </a:solidFill>
+                <a:latin typeface="+mn-ea"/>
+                <a:ea typeface="+mn-ea"/>
+              </a:rPr>
+              <a:t>Best Paper Award </a:t>
+            </a:r>
+            <a:r>
+              <a:rPr lang="en-US" altLang="zh-CN" sz="2000" dirty="0">
+                <a:solidFill>
+                  <a:schemeClr val="tx1"/>
+                </a:solidFill>
+                <a:latin typeface="+mn-ea"/>
+                <a:ea typeface="+mn-ea"/>
+              </a:rPr>
+              <a:t>in IEEE symposium on Computers and Communications’</a:t>
+            </a:r>
+            <a:r>
+              <a:rPr lang="zh-CN" altLang="en-US" sz="2000" dirty="0">
+                <a:solidFill>
+                  <a:schemeClr val="tx1"/>
+                </a:solidFill>
+                <a:latin typeface="+mn-ea"/>
+                <a:ea typeface="+mn-ea"/>
+              </a:rPr>
+              <a:t> </a:t>
+            </a:r>
+            <a:r>
+              <a:rPr lang="en-US" altLang="zh-CN" sz="2000" dirty="0">
+                <a:solidFill>
+                  <a:schemeClr val="tx1"/>
+                </a:solidFill>
+                <a:latin typeface="+mn-ea"/>
+                <a:ea typeface="+mn-ea"/>
+              </a:rPr>
+              <a:t>2021</a:t>
+            </a:r>
+          </a:p>
+        </p:txBody>
+      </p:sp>
+    </p:spTree>
+    <p:extLst>
+      <p:ext uri="{BB962C8B-B14F-4D97-AF65-F5344CB8AC3E}">
+        <p14:creationId xmlns:p14="http://schemas.microsoft.com/office/powerpoint/2010/main" val="780686075"/>
+      </p:ext>
+    </p:extLst>
+  </p:cSld>
+  <p:clrMapOvr>
+    <a:masterClrMapping/>
+  </p:clrMapOvr>
+  <mc:AlternateContent xmlns:mc="http://schemas.openxmlformats.org/markup-compatibility/2006" xmlns:p14="http://schemas.microsoft.com/office/powerpoint/2010/main">
+    <mc:Choice Requires="p14">
+      <p:transition spd="med" p14:dur="700">
+        <p:fade/>
+      </p:transition>
+    </mc:Choice>
+    <mc:Fallback xmlns="">
+      <p:transition spd="med">
+        <p:fade/>
+      </p:transition>
+    </mc:Fallback>
+  </mc:AlternateContent>
+</p:sld>
+</file>
+
+<file path=ppt/slides/slide20.xml><?xml version="1.0" encoding="utf-8"?>
+<p:sld xmlns:a="http://schemas.openxmlformats.org/drawingml/2006/main" xmlns:r="http://schemas.openxmlformats.org/officeDocument/2006/relationships" xmlns:p="http://schemas.openxmlformats.org/presentationml/2006/main">
+  <p:cSld>
+    <p:spTree>
+      <p:nvGrpSpPr>
+        <p:cNvPr id="1" name=""/>
+        <p:cNvGrpSpPr/>
+        <p:nvPr/>
+      </p:nvGrpSpPr>
+      <p:grpSpPr>
+        <a:xfrm>
+          <a:off x="0" y="0"/>
+          <a:ext cx="0" cy="0"/>
+          <a:chOff x="0" y="0"/>
+          <a:chExt cx="0" cy="0"/>
+        </a:xfrm>
+      </p:grpSpPr>
+      <p:sp>
+        <p:nvSpPr>
           <p:cNvPr id="2" name="标题 1">
             <a:extLst>
               <a:ext uri="{FF2B5EF4-FFF2-40B4-BE49-F238E27FC236}">
@@ -9959,7 +8874,7 @@
             <a:fld id="{565CE74E-AB26-4998-AD42-012C4C1AD076}" type="slidenum">
               <a:rPr lang="zh-CN" altLang="en-US" smtClean="0"/>
               <a:pPr/>
-              <a:t>23</a:t>
+              <a:t>20</a:t>
             </a:fld>
             <a:endParaRPr lang="zh-CN" altLang="en-US"/>
           </a:p>
@@ -10146,7 +9061,7 @@
 </p:sld>
 </file>
 
-<file path=ppt/slides/slide24.xml><?xml version="1.0" encoding="utf-8"?>
+<file path=ppt/slides/slide21.xml><?xml version="1.0" encoding="utf-8"?>
 <p:sld xmlns:a="http://schemas.openxmlformats.org/drawingml/2006/main" xmlns:r="http://schemas.openxmlformats.org/officeDocument/2006/relationships" xmlns:p="http://schemas.openxmlformats.org/presentationml/2006/main">
   <p:cSld>
     <p:spTree>
@@ -10220,7 +9135,7 @@
             <a:fld id="{565CE74E-AB26-4998-AD42-012C4C1AD076}" type="slidenum">
               <a:rPr lang="zh-CN" altLang="en-US" smtClean="0"/>
               <a:pPr/>
-              <a:t>24</a:t>
+              <a:t>21</a:t>
             </a:fld>
             <a:endParaRPr lang="zh-CN" altLang="en-US"/>
           </a:p>
@@ -10411,7 +9326,7 @@
 </p:sld>
 </file>
 
-<file path=ppt/slides/slide25.xml><?xml version="1.0" encoding="utf-8"?>
+<file path=ppt/slides/slide22.xml><?xml version="1.0" encoding="utf-8"?>
 <p:sld xmlns:a="http://schemas.openxmlformats.org/drawingml/2006/main" xmlns:r="http://schemas.openxmlformats.org/officeDocument/2006/relationships" xmlns:p="http://schemas.openxmlformats.org/presentationml/2006/main">
   <p:cSld>
     <p:spTree>
@@ -10467,7 +9382,7 @@
           <a:p>
             <a:fld id="{565CE74E-AB26-4998-AD42-012C4C1AD076}" type="slidenum">
               <a:rPr lang="zh-CN" altLang="en-US" smtClean="0"/>
-              <a:t>25</a:t>
+              <a:t>22</a:t>
             </a:fld>
             <a:endParaRPr lang="zh-CN" altLang="en-US"/>
           </a:p>
@@ -10592,7 +9507,7 @@
           <a:p>
             <a:fld id="{565CE74E-AB26-4998-AD42-012C4C1AD076}" type="slidenum">
               <a:rPr lang="zh-CN" altLang="en-US" smtClean="0"/>
-              <a:t>25</a:t>
+              <a:t>22</a:t>
             </a:fld>
             <a:endParaRPr lang="zh-CN" altLang="en-US"/>
           </a:p>
@@ -10648,21 +9563,33 @@
       </p:sp>
       <p:grpSp>
         <p:nvGrpSpPr>
-          <p:cNvPr id="7" name="组合 6"/>
+          <p:cNvPr id="12" name="组合 11">
+            <a:extLst>
+              <a:ext uri="{FF2B5EF4-FFF2-40B4-BE49-F238E27FC236}">
+                <a16:creationId xmlns:a16="http://schemas.microsoft.com/office/drawing/2014/main" id="{BECA7C2C-FE5C-42AF-BC07-3C0F078245DC}"/>
+              </a:ext>
+            </a:extLst>
+          </p:cNvPr>
           <p:cNvGrpSpPr/>
           <p:nvPr/>
         </p:nvGrpSpPr>
         <p:grpSpPr>
           <a:xfrm>
-            <a:off x="2023507" y="3761979"/>
-            <a:ext cx="8204040" cy="3263522"/>
-            <a:chOff x="2648434" y="3847537"/>
-            <a:chExt cx="6954946" cy="3263522"/>
+            <a:off x="1933893" y="3617727"/>
+            <a:ext cx="8599163" cy="2432525"/>
+            <a:chOff x="2529283" y="3857317"/>
+            <a:chExt cx="7289910" cy="2432525"/>
           </a:xfrm>
         </p:grpSpPr>
         <p:sp>
           <p:nvSpPr>
-            <p:cNvPr id="30" name="文本框 13"/>
+            <p:cNvPr id="13" name="文本框 13">
+              <a:extLst>
+                <a:ext uri="{FF2B5EF4-FFF2-40B4-BE49-F238E27FC236}">
+                  <a16:creationId xmlns:a16="http://schemas.microsoft.com/office/drawing/2014/main" id="{CD194864-CF0E-47F1-91DC-77B1DBFF6F68}"/>
+                </a:ext>
+              </a:extLst>
+            </p:cNvPr>
             <p:cNvSpPr txBox="1">
               <a:spLocks noChangeArrowheads="1"/>
             </p:cNvSpPr>
@@ -10670,8 +9597,8 @@
           </p:nvSpPr>
           <p:spPr bwMode="auto">
             <a:xfrm>
-              <a:off x="2648434" y="3847537"/>
-              <a:ext cx="6954946" cy="3263522"/>
+              <a:off x="2529283" y="3857317"/>
+              <a:ext cx="7289910" cy="2432525"/>
             </a:xfrm>
             <a:prstGeom prst="rect">
               <a:avLst/>
@@ -10701,7 +9628,7 @@
             </a:extLst>
           </p:spPr>
           <p:txBody>
-            <a:bodyPr>
+            <a:bodyPr wrap="square">
               <a:spAutoFit/>
             </a:bodyPr>
             <a:lstStyle>
@@ -10845,76 +9772,13 @@
                 </a:rPr>
                 <a:t>Beibei Li</a:t>
               </a:r>
-              <a:r>
-                <a:rPr lang="en-US" altLang="zh-CN" b="1" dirty="0">
-                  <a:solidFill>
-                    <a:prstClr val="black"/>
-                  </a:solidFill>
-                  <a:latin typeface="微软雅黑" panose="020B0503020204020204" pitchFamily="34" charset="-122"/>
-                  <a:ea typeface="微软雅黑" panose="020B0503020204020204" pitchFamily="34" charset="-122"/>
-                </a:rPr>
-                <a:t>, </a:t>
-              </a:r>
-              <a:r>
-                <a:rPr lang="en-US" altLang="zh-CN" b="1" dirty="0" err="1">
-                  <a:solidFill>
-                    <a:prstClr val="black"/>
-                  </a:solidFill>
-                  <a:latin typeface="微软雅黑" panose="020B0503020204020204" pitchFamily="34" charset="-122"/>
-                  <a:ea typeface="微软雅黑" panose="020B0503020204020204" pitchFamily="34" charset="-122"/>
-                </a:rPr>
-                <a:t>Peiran</a:t>
-              </a:r>
-              <a:r>
-                <a:rPr lang="en-US" altLang="zh-CN" b="1" dirty="0">
-                  <a:solidFill>
-                    <a:prstClr val="black"/>
-                  </a:solidFill>
-                  <a:latin typeface="微软雅黑" panose="020B0503020204020204" pitchFamily="34" charset="-122"/>
-                  <a:ea typeface="微软雅黑" panose="020B0503020204020204" pitchFamily="34" charset="-122"/>
-                </a:rPr>
-                <a:t> Wang, </a:t>
-              </a:r>
-              <a:r>
-                <a:rPr lang="en-US" altLang="zh-CN" b="1" dirty="0" err="1">
-                  <a:solidFill>
-                    <a:prstClr val="black"/>
-                  </a:solidFill>
-                  <a:latin typeface="微软雅黑" panose="020B0503020204020204" pitchFamily="34" charset="-122"/>
-                  <a:ea typeface="微软雅黑" panose="020B0503020204020204" pitchFamily="34" charset="-122"/>
-                </a:rPr>
-                <a:t>Hanyuan</a:t>
-              </a:r>
-              <a:r>
-                <a:rPr lang="en-US" altLang="zh-CN" b="1" dirty="0">
-                  <a:solidFill>
-                    <a:prstClr val="black"/>
-                  </a:solidFill>
-                  <a:latin typeface="微软雅黑" panose="020B0503020204020204" pitchFamily="34" charset="-122"/>
-                  <a:ea typeface="微软雅黑" panose="020B0503020204020204" pitchFamily="34" charset="-122"/>
-                </a:rPr>
-                <a:t> Huang, Shang Ma and </a:t>
-              </a:r>
-              <a:r>
-                <a:rPr lang="en-US" altLang="zh-CN" b="1" dirty="0" err="1">
-                  <a:solidFill>
-                    <a:prstClr val="black"/>
-                  </a:solidFill>
-                  <a:latin typeface="微软雅黑" panose="020B0503020204020204" pitchFamily="34" charset="-122"/>
-                  <a:ea typeface="微软雅黑" panose="020B0503020204020204" pitchFamily="34" charset="-122"/>
-                </a:rPr>
-                <a:t>Yukun</a:t>
-              </a:r>
-              <a:r>
-                <a:rPr lang="en-US" altLang="zh-CN" b="1" dirty="0">
-                  <a:solidFill>
-                    <a:prstClr val="black"/>
-                  </a:solidFill>
-                  <a:latin typeface="微软雅黑" panose="020B0503020204020204" pitchFamily="34" charset="-122"/>
-                  <a:ea typeface="微软雅黑" panose="020B0503020204020204" pitchFamily="34" charset="-122"/>
-                </a:rPr>
-                <a:t> Jiang</a:t>
-              </a:r>
+              <a:endParaRPr lang="en-US" altLang="zh-CN" b="1" dirty="0">
+                <a:solidFill>
+                  <a:prstClr val="black"/>
+                </a:solidFill>
+                <a:latin typeface="微软雅黑" panose="020B0503020204020204" pitchFamily="34" charset="-122"/>
+                <a:ea typeface="微软雅黑" panose="020B0503020204020204" pitchFamily="34" charset="-122"/>
+              </a:endParaRPr>
             </a:p>
             <a:p>
               <a:pPr marL="0" marR="0" lvl="0" indent="0" algn="ctr" defTabSz="914400" rtl="0" eaLnBrk="1" fontAlgn="auto" latinLnBrk="0" hangingPunct="1">
@@ -10934,6 +9798,16 @@
                 <a:defRPr/>
               </a:pPr>
               <a:r>
+                <a:rPr lang="en-US" altLang="zh-CN" b="1" dirty="0">
+                  <a:solidFill>
+                    <a:prstClr val="black"/>
+                  </a:solidFill>
+                  <a:latin typeface="微软雅黑" panose="020B0503020204020204" pitchFamily="34" charset="-122"/>
+                  <a:ea typeface="微软雅黑" panose="020B0503020204020204" pitchFamily="34" charset="-122"/>
+                </a:rPr>
+                <a:t>Jan</a:t>
+              </a:r>
+              <a:r>
                 <a:rPr kumimoji="0" lang="en-US" altLang="zh-CN" sz="1800" b="1" i="0" u="none" strike="noStrike" kern="1200" cap="none" spc="0" normalizeH="0" baseline="0" noProof="0" dirty="0">
                   <a:ln>
                     <a:noFill/>
@@ -10948,7 +9822,34 @@
                   <a:ea typeface="微软雅黑" panose="020B0503020204020204" pitchFamily="34" charset="-122"/>
                   <a:cs typeface="+mn-cs"/>
                 </a:rPr>
-                <a:t>Sept. 5,</a:t>
+                <a:t>. </a:t>
+              </a:r>
+              <a:r>
+                <a:rPr lang="en-US" altLang="zh-CN" b="1" dirty="0">
+                  <a:solidFill>
+                    <a:prstClr val="black"/>
+                  </a:solidFill>
+                  <a:latin typeface="微软雅黑" panose="020B0503020204020204" pitchFamily="34" charset="-122"/>
+                  <a:ea typeface="微软雅黑" panose="020B0503020204020204" pitchFamily="34" charset="-122"/>
+                </a:rPr>
+                <a:t>20</a:t>
+              </a:r>
+              <a:r>
+                <a:rPr kumimoji="0" lang="en-US" altLang="zh-CN" sz="1800" b="1" i="0" u="none" strike="noStrike" kern="1200" cap="none" spc="0" normalizeH="0" baseline="0" noProof="0" dirty="0">
+                  <a:ln>
+                    <a:noFill/>
+                  </a:ln>
+                  <a:solidFill>
+                    <a:prstClr val="black"/>
+                  </a:solidFill>
+                  <a:effectLst/>
+                  <a:uLnTx/>
+                  <a:uFillTx/>
+                  <a:latin typeface="微软雅黑" panose="020B0503020204020204" pitchFamily="34" charset="-122"/>
+                  <a:ea typeface="微软雅黑" panose="020B0503020204020204" pitchFamily="34" charset="-122"/>
+                  <a:cs typeface="+mn-cs"/>
+                </a:rPr>
+                <a:t>,</a:t>
               </a:r>
               <a:r>
                 <a:rPr kumimoji="0" lang="en-US" altLang="zh-CN" sz="1800" b="1" i="0" u="none" strike="noStrike" kern="1200" cap="none" spc="0" normalizeH="0" noProof="0" dirty="0">
@@ -10965,7 +9866,7 @@
                   <a:ea typeface="微软雅黑" panose="020B0503020204020204" pitchFamily="34" charset="-122"/>
                   <a:cs typeface="+mn-cs"/>
                 </a:rPr>
-                <a:t> 2021</a:t>
+                <a:t> 2022</a:t>
               </a:r>
               <a:endParaRPr kumimoji="0" lang="en-US" altLang="zh-CN" sz="1800" b="1" i="0" u="none" strike="noStrike" kern="1200" cap="none" spc="0" normalizeH="0" baseline="0" noProof="0" dirty="0">
                 <a:ln>
@@ -11013,7 +9914,7 @@
                   <a:ea typeface="微软雅黑" panose="020B0503020204020204" pitchFamily="34" charset="-122"/>
                   <a:cs typeface="+mn-cs"/>
                 </a:rPr>
-                <a:t> College of Cybersecurity, Sichuan University, P.R. China</a:t>
+                <a:t> College of Cyber Science and Engineering, Sichuan University, P.R. China</a:t>
               </a:r>
               <a:endParaRPr kumimoji="0" lang="zh-CN" altLang="en-US" sz="1800" b="1" i="0" u="none" strike="noStrike" kern="1200" cap="none" spc="0" normalizeH="0" baseline="0" noProof="0" dirty="0">
                 <a:ln>
@@ -11034,7 +9935,13 @@
         </p:sp>
         <p:grpSp>
           <p:nvGrpSpPr>
-            <p:cNvPr id="8" name="组合 7"/>
+            <p:cNvPr id="14" name="组合 13">
+              <a:extLst>
+                <a:ext uri="{FF2B5EF4-FFF2-40B4-BE49-F238E27FC236}">
+                  <a16:creationId xmlns:a16="http://schemas.microsoft.com/office/drawing/2014/main" id="{84E656C2-7ED1-41A7-90DB-2EEC0236B285}"/>
+                </a:ext>
+              </a:extLst>
+            </p:cNvPr>
             <p:cNvGrpSpPr/>
             <p:nvPr/>
           </p:nvGrpSpPr>
@@ -11048,7 +9955,13 @@
           </p:grpSpPr>
           <p:cxnSp>
             <p:nvCxnSpPr>
-              <p:cNvPr id="35" name="直接连接符 34"/>
+              <p:cNvPr id="15" name="直接连接符 14">
+                <a:extLst>
+                  <a:ext uri="{FF2B5EF4-FFF2-40B4-BE49-F238E27FC236}">
+                    <a16:creationId xmlns:a16="http://schemas.microsoft.com/office/drawing/2014/main" id="{02AB8E3F-BBF0-4447-9C88-E949991E6BB6}"/>
+                  </a:ext>
+                </a:extLst>
+              </p:cNvPr>
               <p:cNvCxnSpPr/>
               <p:nvPr/>
             </p:nvCxnSpPr>
@@ -11083,7 +9996,13 @@
           </p:cxnSp>
           <p:cxnSp>
             <p:nvCxnSpPr>
-              <p:cNvPr id="36" name="直接连接符 35"/>
+              <p:cNvPr id="16" name="直接连接符 15">
+                <a:extLst>
+                  <a:ext uri="{FF2B5EF4-FFF2-40B4-BE49-F238E27FC236}">
+                    <a16:creationId xmlns:a16="http://schemas.microsoft.com/office/drawing/2014/main" id="{B11D1994-2E80-449A-93D2-65AC7DF9615D}"/>
+                  </a:ext>
+                </a:extLst>
+              </p:cNvPr>
               <p:cNvCxnSpPr/>
               <p:nvPr/>
             </p:nvCxnSpPr>
@@ -11118,7 +10037,13 @@
           </p:cxnSp>
           <p:cxnSp>
             <p:nvCxnSpPr>
-              <p:cNvPr id="10" name="直接连接符 9"/>
+              <p:cNvPr id="17" name="直接连接符 16">
+                <a:extLst>
+                  <a:ext uri="{FF2B5EF4-FFF2-40B4-BE49-F238E27FC236}">
+                    <a16:creationId xmlns:a16="http://schemas.microsoft.com/office/drawing/2014/main" id="{585FB0AC-E766-4B44-BF97-15CDC9ACDEA8}"/>
+                  </a:ext>
+                </a:extLst>
+              </p:cNvPr>
               <p:cNvCxnSpPr/>
               <p:nvPr/>
             </p:nvCxnSpPr>
@@ -11312,7 +10237,7 @@
             <a:r>
               <a:rPr lang="en-US" altLang="zh-CN" dirty="0">
                 <a:solidFill>
-                  <a:srgbClr val="FF0000"/>
+                  <a:srgbClr val="C00000"/>
                 </a:solidFill>
               </a:rPr>
               <a:t>Byzantine attackers</a:t>
@@ -11336,13 +10261,13 @@
           </a:p>
           <a:p>
             <a:pPr marL="285750" indent="-285750">
-              <a:buFont typeface="Wingdings" panose="05000000000000000000" charset="0"/>
-              <a:buChar char="l"/>
+              <a:buFont typeface="Wingdings" panose="05000000000000000000" pitchFamily="2" charset="2"/>
+              <a:buChar char="p"/>
             </a:pPr>
             <a:r>
               <a:rPr lang="en-US" altLang="zh-CN" dirty="0">
                 <a:solidFill>
-                  <a:srgbClr val="FF0000"/>
+                  <a:srgbClr val="C00000"/>
                 </a:solidFill>
               </a:rPr>
               <a:t>Data Poisoning Attack</a:t>
@@ -11350,6 +10275,41 @@
             <a:r>
               <a:rPr lang="en-US" altLang="zh-CN" dirty="0"/>
               <a:t>: Data poisoning attack is launched during local data collection by label flipping attacks etc.</a:t>
+            </a:r>
+          </a:p>
+          <a:p>
+            <a:pPr marL="285750" indent="-285750">
+              <a:buFont typeface="Wingdings" panose="05000000000000000000" pitchFamily="2" charset="2"/>
+              <a:buChar char="p"/>
+            </a:pPr>
+            <a:endParaRPr lang="en-US" altLang="zh-CN" dirty="0"/>
+          </a:p>
+          <a:p>
+            <a:pPr marL="285750" indent="-285750">
+              <a:buFont typeface="Wingdings" panose="05000000000000000000" pitchFamily="2" charset="2"/>
+              <a:buChar char="p"/>
+            </a:pPr>
+            <a:r>
+              <a:rPr lang="en-US" altLang="zh-CN" dirty="0">
+                <a:solidFill>
+                  <a:srgbClr val="C00000"/>
+                </a:solidFill>
+              </a:rPr>
+              <a:t>Model Poisoning Attack</a:t>
+            </a:r>
+            <a:r>
+              <a:rPr lang="en-US" altLang="zh-CN" dirty="0"/>
+              <a:t>: model poisoning attack is </a:t>
+            </a:r>
+            <a:r>
+              <a:rPr lang="en-US" altLang="zh-CN" dirty="0">
+                <a:sym typeface="+mn-ea"/>
+              </a:rPr>
+              <a:t>launched</a:t>
+            </a:r>
+            <a:r>
+              <a:rPr lang="en-US" altLang="zh-CN" dirty="0"/>
+              <a:t> during local model training process</a:t>
             </a:r>
           </a:p>
           <a:p>
@@ -11360,53 +10320,6 @@
             <a:endParaRPr lang="en-US" altLang="zh-CN" dirty="0"/>
           </a:p>
           <a:p>
-            <a:pPr marL="285750" indent="-285750">
-              <a:buFont typeface="Wingdings" panose="05000000000000000000" charset="0"/>
-              <a:buChar char="l"/>
-            </a:pPr>
-            <a:r>
-              <a:rPr lang="en-US" altLang="zh-CN" dirty="0">
-                <a:solidFill>
-                  <a:srgbClr val="FF0000"/>
-                </a:solidFill>
-              </a:rPr>
-              <a:t>Model Poisoning Attack</a:t>
-            </a:r>
-            <a:r>
-              <a:rPr lang="en-US" altLang="zh-CN" dirty="0"/>
-              <a:t>: model poisoning </a:t>
-            </a:r>
-            <a:r>
-              <a:rPr lang="en-US" altLang="zh-CN"/>
-              <a:t>attack i</a:t>
-            </a:r>
-            <a:r>
-              <a:rPr lang="en-US" altLang="zh-CN" dirty="0"/>
-              <a:t>s</a:t>
-            </a:r>
-            <a:r>
-              <a:rPr lang="en-US" altLang="zh-CN"/>
-              <a:t> </a:t>
-            </a:r>
-            <a:r>
-              <a:rPr lang="en-US" altLang="zh-CN" dirty="0">
-                <a:sym typeface="+mn-ea"/>
-              </a:rPr>
-              <a:t>launched</a:t>
-            </a:r>
-            <a:r>
-              <a:rPr lang="en-US" altLang="zh-CN" dirty="0"/>
-              <a:t> during local model training process</a:t>
-            </a:r>
-          </a:p>
-          <a:p>
-            <a:pPr marL="285750" indent="-285750">
-              <a:buFont typeface="Wingdings" panose="05000000000000000000" charset="0"/>
-              <a:buChar char="l"/>
-            </a:pPr>
-            <a:endParaRPr lang="en-US" altLang="zh-CN" dirty="0"/>
-          </a:p>
-          <a:p>
             <a:pPr indent="0">
               <a:buFont typeface="Wingdings" panose="05000000000000000000" charset="0"/>
               <a:buNone/>
@@ -11418,7 +10331,7 @@
             <a:r>
               <a:rPr lang="en-US" altLang="zh-CN" dirty="0">
                 <a:solidFill>
-                  <a:srgbClr val="FF0000"/>
+                  <a:srgbClr val="C00000"/>
                 </a:solidFill>
               </a:rPr>
               <a:t>violate central model</a:t>
@@ -11560,54 +10473,54 @@
           <a:lstStyle/>
           <a:p>
             <a:r>
-              <a:rPr lang="en-US" altLang="zh-CN"/>
+              <a:rPr lang="en-US" altLang="zh-CN" dirty="0"/>
               <a:t>Traditional FL has many drawbacks:</a:t>
             </a:r>
           </a:p>
           <a:p>
-            <a:endParaRPr lang="en-US" altLang="zh-CN"/>
+            <a:endParaRPr lang="en-US" altLang="zh-CN" dirty="0"/>
           </a:p>
           <a:p>
             <a:pPr marL="285750" indent="-285750">
-              <a:buFont typeface="Arial" panose="020B0604020202020204" pitchFamily="34" charset="0"/>
-              <a:buChar char="•"/>
+              <a:buFont typeface="Wingdings" panose="05000000000000000000" pitchFamily="2" charset="2"/>
+              <a:buChar char="p"/>
             </a:pPr>
             <a:r>
-              <a:rPr lang="en-US" altLang="zh-CN"/>
+              <a:rPr lang="en-US" altLang="zh-CN" dirty="0"/>
               <a:t>Heavy network cost</a:t>
             </a:r>
           </a:p>
           <a:p>
             <a:pPr marL="285750" indent="-285750">
-              <a:buFont typeface="Arial" panose="020B0604020202020204" pitchFamily="34" charset="0"/>
-              <a:buChar char="•"/>
+              <a:buFont typeface="Wingdings" panose="05000000000000000000" pitchFamily="2" charset="2"/>
+              <a:buChar char="p"/>
             </a:pPr>
-            <a:endParaRPr lang="en-US" altLang="zh-CN"/>
+            <a:endParaRPr lang="en-US" altLang="zh-CN" dirty="0"/>
           </a:p>
           <a:p>
             <a:pPr marL="285750" indent="-285750">
-              <a:buFont typeface="Arial" panose="020B0604020202020204" pitchFamily="34" charset="0"/>
-              <a:buChar char="•"/>
+              <a:buFont typeface="Wingdings" panose="05000000000000000000" pitchFamily="2" charset="2"/>
+              <a:buChar char="p"/>
             </a:pPr>
             <a:r>
-              <a:rPr lang="en-US" altLang="zh-CN"/>
+              <a:rPr lang="en-US" altLang="zh-CN" dirty="0"/>
               <a:t>Each FL client should use the same type of deep learning model, such as CNN, LSTM ...</a:t>
             </a:r>
           </a:p>
           <a:p>
             <a:pPr marL="285750" indent="-285750">
-              <a:buFont typeface="Arial" panose="020B0604020202020204" pitchFamily="34" charset="0"/>
-              <a:buChar char="•"/>
+              <a:buFont typeface="Wingdings" panose="05000000000000000000" pitchFamily="2" charset="2"/>
+              <a:buChar char="p"/>
             </a:pPr>
-            <a:endParaRPr lang="en-US" altLang="zh-CN"/>
+            <a:endParaRPr lang="en-US" altLang="zh-CN" dirty="0"/>
           </a:p>
           <a:p>
             <a:pPr marL="285750" indent="-285750">
-              <a:buFont typeface="Arial" panose="020B0604020202020204" pitchFamily="34" charset="0"/>
-              <a:buChar char="•"/>
+              <a:buFont typeface="Wingdings" panose="05000000000000000000" pitchFamily="2" charset="2"/>
+              <a:buChar char="p"/>
             </a:pPr>
             <a:r>
-              <a:rPr lang="en-US" altLang="zh-CN"/>
+              <a:rPr lang="en-US" altLang="zh-CN" dirty="0"/>
               <a:t>Vulnerable to malicious Byzantine attacks</a:t>
             </a:r>
           </a:p>
@@ -11790,71 +10703,71 @@
           <a:lstStyle/>
           <a:p>
             <a:r>
-              <a:rPr lang="en-US" altLang="zh-CN"/>
+              <a:rPr lang="en-US" altLang="zh-CN" b="1" dirty="0"/>
               <a:t>FL Client:</a:t>
             </a:r>
           </a:p>
           <a:p>
-            <a:endParaRPr lang="en-US" altLang="zh-CN"/>
+            <a:endParaRPr lang="en-US" altLang="zh-CN" dirty="0"/>
           </a:p>
           <a:p>
             <a:pPr marL="285750" indent="-285750">
-              <a:buFont typeface="Arial" panose="020B0604020202020204" pitchFamily="34" charset="0"/>
-              <a:buChar char="•"/>
+              <a:buFont typeface="Wingdings" panose="05000000000000000000" pitchFamily="2" charset="2"/>
+              <a:buChar char="p"/>
             </a:pPr>
             <a:r>
-              <a:rPr lang="en-US" altLang="zh-CN"/>
+              <a:rPr lang="en-US" altLang="zh-CN" dirty="0"/>
               <a:t>Collect local data</a:t>
             </a:r>
           </a:p>
           <a:p>
             <a:pPr marL="285750" indent="-285750">
-              <a:buFont typeface="Arial" panose="020B0604020202020204" pitchFamily="34" charset="0"/>
-              <a:buChar char="•"/>
+              <a:buFont typeface="Wingdings" panose="05000000000000000000" pitchFamily="2" charset="2"/>
+              <a:buChar char="p"/>
             </a:pPr>
-            <a:endParaRPr lang="en-US" altLang="zh-CN"/>
+            <a:endParaRPr lang="en-US" altLang="zh-CN" dirty="0"/>
           </a:p>
           <a:p>
             <a:pPr marL="285750" indent="-285750">
-              <a:buFont typeface="Arial" panose="020B0604020202020204" pitchFamily="34" charset="0"/>
-              <a:buChar char="•"/>
+              <a:buFont typeface="Wingdings" panose="05000000000000000000" pitchFamily="2" charset="2"/>
+              <a:buChar char="p"/>
             </a:pPr>
             <a:r>
-              <a:rPr lang="en-US" altLang="zh-CN"/>
+              <a:rPr lang="en-US" altLang="zh-CN" dirty="0"/>
               <a:t>Train a local model</a:t>
             </a:r>
           </a:p>
           <a:p>
             <a:pPr marL="285750" indent="-285750">
-              <a:buFont typeface="Arial" panose="020B0604020202020204" pitchFamily="34" charset="0"/>
-              <a:buChar char="•"/>
+              <a:buFont typeface="Wingdings" panose="05000000000000000000" pitchFamily="2" charset="2"/>
+              <a:buChar char="p"/>
             </a:pPr>
-            <a:endParaRPr lang="en-US" altLang="zh-CN"/>
+            <a:endParaRPr lang="en-US" altLang="zh-CN" dirty="0"/>
           </a:p>
           <a:p>
             <a:pPr marL="285750" indent="-285750">
-              <a:buFont typeface="Arial" panose="020B0604020202020204" pitchFamily="34" charset="0"/>
-              <a:buChar char="•"/>
+              <a:buFont typeface="Wingdings" panose="05000000000000000000" pitchFamily="2" charset="2"/>
+              <a:buChar char="p"/>
             </a:pPr>
             <a:r>
-              <a:rPr lang="en-US" altLang="zh-CN"/>
+              <a:rPr lang="en-US" altLang="zh-CN" dirty="0"/>
               <a:t>Make predictions of the broadcast dataset</a:t>
             </a:r>
           </a:p>
           <a:p>
             <a:pPr marL="285750" indent="-285750">
-              <a:buFont typeface="Arial" panose="020B0604020202020204" pitchFamily="34" charset="0"/>
-              <a:buChar char="•"/>
+              <a:buFont typeface="Wingdings" panose="05000000000000000000" pitchFamily="2" charset="2"/>
+              <a:buChar char="p"/>
             </a:pPr>
-            <a:endParaRPr lang="en-US" altLang="zh-CN"/>
+            <a:endParaRPr lang="en-US" altLang="zh-CN" dirty="0"/>
           </a:p>
           <a:p>
             <a:pPr marL="285750" indent="-285750">
-              <a:buFont typeface="Arial" panose="020B0604020202020204" pitchFamily="34" charset="0"/>
-              <a:buChar char="•"/>
+              <a:buFont typeface="Wingdings" panose="05000000000000000000" pitchFamily="2" charset="2"/>
+              <a:buChar char="p"/>
             </a:pPr>
             <a:r>
-              <a:rPr lang="en-US" altLang="zh-CN"/>
+              <a:rPr lang="en-US" altLang="zh-CN" dirty="0"/>
               <a:t>Transfer the predictions back to the FL server</a:t>
             </a:r>
           </a:p>
@@ -11883,76 +10796,76 @@
           <a:lstStyle/>
           <a:p>
             <a:r>
-              <a:rPr lang="en-US" altLang="zh-CN"/>
+              <a:rPr lang="en-US" altLang="zh-CN" b="1" dirty="0"/>
               <a:t>FL Server:</a:t>
             </a:r>
           </a:p>
           <a:p>
-            <a:endParaRPr lang="en-US" altLang="zh-CN"/>
+            <a:endParaRPr lang="en-US" altLang="zh-CN" dirty="0"/>
           </a:p>
           <a:p>
             <a:pPr marL="285750" indent="-285750">
-              <a:buFont typeface="Arial" panose="020B0604020202020204" pitchFamily="34" charset="0"/>
-              <a:buChar char="•"/>
+              <a:buFont typeface="Wingdings" panose="05000000000000000000" pitchFamily="2" charset="2"/>
+              <a:buChar char="p"/>
             </a:pPr>
             <a:r>
-              <a:rPr lang="en-US" altLang="zh-CN"/>
+              <a:rPr lang="en-US" altLang="zh-CN" dirty="0"/>
               <a:t>Preserve a public dataset</a:t>
             </a:r>
           </a:p>
           <a:p>
             <a:pPr marL="285750" indent="-285750">
-              <a:buFont typeface="Arial" panose="020B0604020202020204" pitchFamily="34" charset="0"/>
-              <a:buChar char="•"/>
+              <a:buFont typeface="Wingdings" panose="05000000000000000000" pitchFamily="2" charset="2"/>
+              <a:buChar char="p"/>
             </a:pPr>
-            <a:endParaRPr lang="en-US" altLang="zh-CN"/>
+            <a:endParaRPr lang="en-US" altLang="zh-CN" dirty="0"/>
           </a:p>
           <a:p>
             <a:pPr marL="285750" indent="-285750">
-              <a:buFont typeface="Arial" panose="020B0604020202020204" pitchFamily="34" charset="0"/>
-              <a:buChar char="•"/>
+              <a:buFont typeface="Wingdings" panose="05000000000000000000" pitchFamily="2" charset="2"/>
+              <a:buChar char="p"/>
             </a:pPr>
             <a:r>
-              <a:rPr lang="en-US" altLang="zh-CN"/>
+              <a:rPr lang="en-US" altLang="zh-CN" dirty="0"/>
               <a:t>Broadcast the public dataset</a:t>
             </a:r>
           </a:p>
           <a:p>
             <a:pPr marL="285750" indent="-285750">
-              <a:buFont typeface="Arial" panose="020B0604020202020204" pitchFamily="34" charset="0"/>
-              <a:buChar char="•"/>
+              <a:buFont typeface="Wingdings" panose="05000000000000000000" pitchFamily="2" charset="2"/>
+              <a:buChar char="p"/>
             </a:pPr>
-            <a:endParaRPr lang="en-US" altLang="zh-CN"/>
+            <a:endParaRPr lang="en-US" altLang="zh-CN" dirty="0"/>
           </a:p>
           <a:p>
             <a:pPr marL="285750" indent="-285750">
-              <a:buFont typeface="Arial" panose="020B0604020202020204" pitchFamily="34" charset="0"/>
-              <a:buChar char="•"/>
+              <a:buFont typeface="Wingdings" panose="05000000000000000000" pitchFamily="2" charset="2"/>
+              <a:buChar char="p"/>
             </a:pPr>
             <a:r>
-              <a:rPr lang="en-US" altLang="zh-CN"/>
+              <a:rPr lang="en-US" altLang="zh-CN" dirty="0"/>
               <a:t>Receive the predictions of the public dataset</a:t>
             </a:r>
           </a:p>
           <a:p>
             <a:pPr marL="285750" indent="-285750">
-              <a:buFont typeface="Arial" panose="020B0604020202020204" pitchFamily="34" charset="0"/>
-              <a:buChar char="•"/>
+              <a:buFont typeface="Wingdings" panose="05000000000000000000" pitchFamily="2" charset="2"/>
+              <a:buChar char="p"/>
             </a:pPr>
-            <a:endParaRPr lang="en-US" altLang="zh-CN"/>
+            <a:endParaRPr lang="en-US" altLang="zh-CN" dirty="0"/>
           </a:p>
           <a:p>
             <a:pPr marL="285750" indent="-285750">
-              <a:buFont typeface="Arial" panose="020B0604020202020204" pitchFamily="34" charset="0"/>
-              <a:buChar char="•"/>
+              <a:buFont typeface="Wingdings" panose="05000000000000000000" pitchFamily="2" charset="2"/>
+              <a:buChar char="p"/>
             </a:pPr>
             <a:r>
-              <a:rPr lang="en-US" altLang="zh-CN">
+              <a:rPr lang="en-US" altLang="zh-CN" dirty="0">
                 <a:sym typeface="+mn-ea"/>
               </a:rPr>
               <a:t>Aggregate the predictions of the public dataset</a:t>
             </a:r>
-            <a:endParaRPr lang="en-US" altLang="zh-CN"/>
+            <a:endParaRPr lang="en-US" altLang="zh-CN" dirty="0"/>
           </a:p>
         </p:txBody>
       </p:sp>
@@ -12378,118 +11291,170 @@
           </a:bodyPr>
           <a:lstStyle/>
           <a:p>
-            <a:pPr marL="285750" indent="-285750">
-              <a:buFont typeface="Arial" panose="020B0604020202020204" pitchFamily="34" charset="0"/>
-              <a:buChar char="•"/>
+            <a:pPr marL="342900" indent="-342900">
+              <a:buFont typeface="Wingdings" panose="05000000000000000000" pitchFamily="2" charset="2"/>
+              <a:buChar char="p"/>
             </a:pPr>
             <a:r>
-              <a:rPr lang="zh-CN" altLang="en-US" sz="2000"/>
-              <a:t>First, we propose a novel reputation-based phishing</a:t>
-            </a:r>
-            <a:r>
-              <a:rPr lang="en-US" altLang="zh-CN" sz="2000"/>
+              <a:rPr lang="zh-CN" altLang="en-US" sz="2000" dirty="0"/>
+              <a:t>First, we propose </a:t>
+            </a:r>
+            <a:r>
+              <a:rPr lang="zh-CN" altLang="en-US" sz="2000" dirty="0">
+                <a:solidFill>
+                  <a:srgbClr val="C00000"/>
+                </a:solidFill>
+              </a:rPr>
+              <a:t>a novel reputation-based phishing</a:t>
+            </a:r>
+            <a:r>
+              <a:rPr lang="en-US" altLang="zh-CN" sz="2000" dirty="0">
+                <a:solidFill>
+                  <a:srgbClr val="C00000"/>
+                </a:solidFill>
+              </a:rPr>
               <a:t> </a:t>
             </a:r>
             <a:r>
-              <a:rPr lang="zh-CN" altLang="en-US" sz="2000"/>
-              <a:t>scheme, called FLPhish, which can effectively defend</a:t>
-            </a:r>
-            <a:r>
-              <a:rPr lang="en-US" altLang="zh-CN" sz="2000"/>
+              <a:rPr lang="zh-CN" altLang="en-US" sz="2000" dirty="0">
+                <a:solidFill>
+                  <a:srgbClr val="C00000"/>
+                </a:solidFill>
+              </a:rPr>
+              <a:t>scheme</a:t>
+            </a:r>
+            <a:r>
+              <a:rPr lang="zh-CN" altLang="en-US" sz="2000" dirty="0"/>
+              <a:t>, called FLPhish, which can effectively defend</a:t>
+            </a:r>
+            <a:r>
+              <a:rPr lang="en-US" altLang="zh-CN" sz="2000" dirty="0"/>
               <a:t> </a:t>
             </a:r>
             <a:r>
-              <a:rPr lang="zh-CN" altLang="en-US" sz="2000"/>
+              <a:rPr lang="zh-CN" altLang="en-US" sz="2000" dirty="0"/>
               <a:t>against Byzantine attacks in Ensemble FL.</a:t>
             </a:r>
           </a:p>
           <a:p>
-            <a:pPr marL="285750" indent="-285750">
-              <a:buFont typeface="Arial" panose="020B0604020202020204" pitchFamily="34" charset="0"/>
-              <a:buChar char="•"/>
+            <a:pPr marL="342900" indent="-342900">
+              <a:buFont typeface="Wingdings" panose="05000000000000000000" pitchFamily="2" charset="2"/>
+              <a:buChar char="p"/>
             </a:pPr>
-            <a:endParaRPr lang="zh-CN" altLang="en-US" sz="2000"/>
-          </a:p>
-          <a:p>
-            <a:pPr marL="285750" indent="-285750">
-              <a:buFont typeface="Arial" panose="020B0604020202020204" pitchFamily="34" charset="0"/>
-              <a:buChar char="•"/>
+            <a:endParaRPr lang="zh-CN" altLang="en-US" sz="2000" dirty="0"/>
+          </a:p>
+          <a:p>
+            <a:pPr marL="342900" indent="-342900">
+              <a:buFont typeface="Wingdings" panose="05000000000000000000" pitchFamily="2" charset="2"/>
+              <a:buChar char="p"/>
             </a:pPr>
             <a:r>
-              <a:rPr lang="zh-CN" altLang="en-US" sz="2000"/>
-              <a:t>Second, we design a new Ensemble FL architecture,</a:t>
-            </a:r>
-            <a:r>
-              <a:rPr lang="en-US" altLang="zh-CN" sz="2000"/>
+              <a:rPr lang="zh-CN" altLang="en-US" sz="2000" dirty="0"/>
+              <a:t>Second, we design </a:t>
+            </a:r>
+            <a:r>
+              <a:rPr lang="zh-CN" altLang="en-US" sz="2000" dirty="0">
+                <a:solidFill>
+                  <a:srgbClr val="C00000"/>
+                </a:solidFill>
+              </a:rPr>
+              <a:t>a new Ensemble FL architecture</a:t>
+            </a:r>
+            <a:r>
+              <a:rPr lang="zh-CN" altLang="en-US" sz="2000" dirty="0"/>
+              <a:t>,</a:t>
+            </a:r>
+            <a:r>
+              <a:rPr lang="en-US" altLang="zh-CN" sz="2000" dirty="0"/>
               <a:t> </a:t>
             </a:r>
             <a:r>
-              <a:rPr lang="zh-CN" altLang="en-US" sz="2000"/>
+              <a:rPr lang="zh-CN" altLang="en-US" sz="2000" dirty="0"/>
               <a:t>which utilizes an unlabeled dataset and the clients’ predictions to update the global model. This architecture</a:t>
             </a:r>
             <a:r>
-              <a:rPr lang="en-US" altLang="zh-CN" sz="2000"/>
+              <a:rPr lang="en-US" altLang="zh-CN" sz="2000" dirty="0"/>
               <a:t> </a:t>
             </a:r>
             <a:r>
-              <a:rPr lang="zh-CN" altLang="en-US" sz="2000"/>
+              <a:rPr lang="zh-CN" altLang="en-US" sz="2000" dirty="0"/>
               <a:t>allows implementation of various deep learning models</a:t>
             </a:r>
             <a:r>
-              <a:rPr lang="en-US" altLang="zh-CN" sz="2000"/>
+              <a:rPr lang="en-US" altLang="zh-CN" sz="2000" dirty="0"/>
               <a:t> </a:t>
             </a:r>
             <a:r>
-              <a:rPr lang="zh-CN" altLang="en-US" sz="2000"/>
+              <a:rPr lang="zh-CN" altLang="en-US" sz="2000" dirty="0"/>
               <a:t>in each client, which makes FL more flexible.</a:t>
             </a:r>
           </a:p>
           <a:p>
-            <a:pPr marL="285750" indent="-285750">
-              <a:buFont typeface="Arial" panose="020B0604020202020204" pitchFamily="34" charset="0"/>
-              <a:buChar char="•"/>
+            <a:pPr marL="342900" indent="-342900">
+              <a:buFont typeface="Wingdings" panose="05000000000000000000" pitchFamily="2" charset="2"/>
+              <a:buChar char="p"/>
             </a:pPr>
-            <a:endParaRPr lang="zh-CN" altLang="en-US" sz="2000"/>
-          </a:p>
-          <a:p>
-            <a:pPr marL="285750" indent="-285750">
-              <a:buFont typeface="Arial" panose="020B0604020202020204" pitchFamily="34" charset="0"/>
-              <a:buChar char="•"/>
+            <a:endParaRPr lang="zh-CN" altLang="en-US" sz="2000" dirty="0"/>
+          </a:p>
+          <a:p>
+            <a:pPr marL="342900" indent="-342900">
+              <a:buFont typeface="Wingdings" panose="05000000000000000000" pitchFamily="2" charset="2"/>
+              <a:buChar char="p"/>
             </a:pPr>
             <a:r>
-              <a:rPr lang="zh-CN" altLang="en-US" sz="2000"/>
-              <a:t>Third, we craft a robust phishing mechanism for the</a:t>
-            </a:r>
-            <a:r>
-              <a:rPr lang="en-US" altLang="zh-CN" sz="2000"/>
+              <a:rPr lang="zh-CN" altLang="en-US" sz="2000" dirty="0"/>
+              <a:t>Third, we craft </a:t>
+            </a:r>
+            <a:r>
+              <a:rPr lang="zh-CN" altLang="en-US" sz="2000" dirty="0">
+                <a:solidFill>
+                  <a:srgbClr val="C00000"/>
+                </a:solidFill>
+              </a:rPr>
+              <a:t>a robust phishing mechanism for the</a:t>
+            </a:r>
+            <a:r>
+              <a:rPr lang="en-US" altLang="zh-CN" sz="2000" dirty="0">
+                <a:solidFill>
+                  <a:srgbClr val="C00000"/>
+                </a:solidFill>
+              </a:rPr>
               <a:t> </a:t>
             </a:r>
             <a:r>
-              <a:rPr lang="zh-CN" altLang="en-US" sz="2000"/>
-              <a:t>Ensemble FL architecture to identify Byzantine attacks,</a:t>
-            </a:r>
-            <a:r>
-              <a:rPr lang="en-US" altLang="zh-CN" sz="2000"/>
+              <a:rPr lang="zh-CN" altLang="en-US" sz="2000" dirty="0">
+                <a:solidFill>
+                  <a:srgbClr val="C00000"/>
+                </a:solidFill>
+              </a:rPr>
+              <a:t>Ensemble FL architecture</a:t>
+            </a:r>
+            <a:r>
+              <a:rPr lang="zh-CN" altLang="en-US" sz="2000" dirty="0"/>
+              <a:t> to identify Byzantine attacks,</a:t>
+            </a:r>
+            <a:r>
+              <a:rPr lang="en-US" altLang="zh-CN" sz="2000" dirty="0"/>
               <a:t> </a:t>
             </a:r>
             <a:r>
-              <a:rPr lang="zh-CN" altLang="en-US" sz="2000"/>
+              <a:rPr lang="zh-CN" altLang="en-US" sz="2000" dirty="0"/>
               <a:t>where a predefined labeled dataset is employed to detect</a:t>
             </a:r>
             <a:r>
-              <a:rPr lang="en-US" altLang="zh-CN" sz="2000"/>
+              <a:rPr lang="en-US" altLang="zh-CN" sz="2000" dirty="0"/>
               <a:t> </a:t>
             </a:r>
             <a:r>
-              <a:rPr lang="zh-CN" altLang="en-US" sz="2000"/>
+              <a:rPr lang="zh-CN" altLang="en-US" sz="2000" dirty="0"/>
               <a:t>the potential Byzantine clients who will make wrong</a:t>
             </a:r>
             <a:r>
-              <a:rPr lang="en-US" altLang="zh-CN" sz="2000"/>
+              <a:rPr lang="en-US" altLang="zh-CN" sz="2000" dirty="0"/>
               <a:t> </a:t>
             </a:r>
             <a:r>
-              <a:rPr lang="zh-CN" altLang="en-US" sz="2000"/>
+              <a:rPr lang="zh-CN" altLang="en-US" sz="2000" dirty="0"/>
               <a:t>predictions about the labeled dataset in Ensemble FL.</a:t>
             </a:r>
           </a:p>

</xml_diff>